<commit_message>
added list data type
</commit_message>
<xml_diff>
--- a/prog/Bevezetés a Programozás Világába.pptx
+++ b/prog/Bevezetés a Programozás Világába.pptx
@@ -5,7 +5,7 @@
     <p:sldMasterId id="2147483659" r:id="rId1"/>
   </p:sldMasterIdLst>
   <p:notesMasterIdLst>
-    <p:notesMasterId r:id="rId30"/>
+    <p:notesMasterId r:id="rId34"/>
   </p:notesMasterIdLst>
   <p:sldIdLst>
     <p:sldId id="256" r:id="rId2"/>
@@ -28,38 +28,42 @@
     <p:sldId id="282" r:id="rId19"/>
     <p:sldId id="283" r:id="rId20"/>
     <p:sldId id="266" r:id="rId21"/>
-    <p:sldId id="267" r:id="rId22"/>
-    <p:sldId id="268" r:id="rId23"/>
-    <p:sldId id="269" r:id="rId24"/>
-    <p:sldId id="270" r:id="rId25"/>
-    <p:sldId id="271" r:id="rId26"/>
-    <p:sldId id="272" r:id="rId27"/>
-    <p:sldId id="273" r:id="rId28"/>
-    <p:sldId id="274" r:id="rId29"/>
+    <p:sldId id="284" r:id="rId22"/>
+    <p:sldId id="285" r:id="rId23"/>
+    <p:sldId id="286" r:id="rId24"/>
+    <p:sldId id="287" r:id="rId25"/>
+    <p:sldId id="267" r:id="rId26"/>
+    <p:sldId id="268" r:id="rId27"/>
+    <p:sldId id="269" r:id="rId28"/>
+    <p:sldId id="270" r:id="rId29"/>
+    <p:sldId id="271" r:id="rId30"/>
+    <p:sldId id="272" r:id="rId31"/>
+    <p:sldId id="273" r:id="rId32"/>
+    <p:sldId id="274" r:id="rId33"/>
   </p:sldIdLst>
   <p:sldSz cx="9144000" cy="5143500" type="screen16x9"/>
   <p:notesSz cx="6858000" cy="9144000"/>
   <p:embeddedFontLst>
     <p:embeddedFont>
       <p:font typeface="Lato" panose="020F0502020204030203" pitchFamily="34" charset="0"/>
-      <p:regular r:id="rId31"/>
-      <p:bold r:id="rId32"/>
-      <p:italic r:id="rId33"/>
-      <p:boldItalic r:id="rId34"/>
-    </p:embeddedFont>
-    <p:embeddedFont>
-      <p:font typeface="Playfair Display" panose="00000500000000000000" pitchFamily="2" charset="0"/>
       <p:regular r:id="rId35"/>
       <p:bold r:id="rId36"/>
       <p:italic r:id="rId37"/>
       <p:boldItalic r:id="rId38"/>
     </p:embeddedFont>
     <p:embeddedFont>
-      <p:font typeface="Roboto" panose="02000000000000000000" pitchFamily="2" charset="0"/>
+      <p:font typeface="Playfair Display" panose="00000500000000000000" pitchFamily="2" charset="0"/>
       <p:regular r:id="rId39"/>
       <p:bold r:id="rId40"/>
       <p:italic r:id="rId41"/>
       <p:boldItalic r:id="rId42"/>
+    </p:embeddedFont>
+    <p:embeddedFont>
+      <p:font typeface="Roboto" panose="02000000000000000000" pitchFamily="2" charset="0"/>
+      <p:regular r:id="rId43"/>
+      <p:bold r:id="rId44"/>
+      <p:italic r:id="rId45"/>
+      <p:boldItalic r:id="rId46"/>
     </p:embeddedFont>
   </p:embeddedFontLst>
   <p:defaultTextStyle>
@@ -10953,6 +10957,825 @@
   <p:cSld>
     <p:spTree>
       <p:nvGrpSpPr>
+        <p:cNvPr id="1" name=""/>
+        <p:cNvGrpSpPr/>
+        <p:nvPr/>
+      </p:nvGrpSpPr>
+      <p:grpSpPr>
+        <a:xfrm>
+          <a:off x="0" y="0"/>
+          <a:ext cx="0" cy="0"/>
+          <a:chOff x="0" y="0"/>
+          <a:chExt cx="0" cy="0"/>
+        </a:xfrm>
+      </p:grpSpPr>
+      <p:sp>
+        <p:nvSpPr>
+          <p:cNvPr id="2" name="Cím 1">
+            <a:extLst>
+              <a:ext uri="{FF2B5EF4-FFF2-40B4-BE49-F238E27FC236}">
+                <a16:creationId xmlns:a16="http://schemas.microsoft.com/office/drawing/2014/main" id="{35FA2FCC-9C77-3CE4-3CA6-499EC4652640}"/>
+              </a:ext>
+            </a:extLst>
+          </p:cNvPr>
+          <p:cNvSpPr>
+            <a:spLocks noGrp="1"/>
+          </p:cNvSpPr>
+          <p:nvPr>
+            <p:ph type="title"/>
+          </p:nvPr>
+        </p:nvSpPr>
+        <p:spPr/>
+        <p:txBody>
+          <a:bodyPr>
+            <a:normAutofit fontScale="90000"/>
+          </a:bodyPr>
+          <a:lstStyle/>
+          <a:p>
+            <a:r>
+              <a:rPr lang="hu-HU" dirty="0"/>
+              <a:t>Listák</a:t>
+            </a:r>
+            <a:endParaRPr lang="en-US" dirty="0"/>
+          </a:p>
+        </p:txBody>
+      </p:sp>
+      <p:sp>
+        <p:nvSpPr>
+          <p:cNvPr id="3" name="Szöveg helye 2">
+            <a:extLst>
+              <a:ext uri="{FF2B5EF4-FFF2-40B4-BE49-F238E27FC236}">
+                <a16:creationId xmlns:a16="http://schemas.microsoft.com/office/drawing/2014/main" id="{3AF34660-4CC3-2CB5-6753-8F15E5C04DA5}"/>
+              </a:ext>
+            </a:extLst>
+          </p:cNvPr>
+          <p:cNvSpPr>
+            <a:spLocks noGrp="1"/>
+          </p:cNvSpPr>
+          <p:nvPr>
+            <p:ph type="body" idx="1"/>
+          </p:nvPr>
+        </p:nvSpPr>
+        <p:spPr/>
+        <p:txBody>
+          <a:bodyPr/>
+          <a:lstStyle/>
+          <a:p>
+            <a:r>
+              <a:rPr lang="hu-HU" dirty="0"/>
+              <a:t>Feladat: Egy program, ami eltárolja a kívánságainkat.</a:t>
+            </a:r>
+            <a:endParaRPr lang="en-US" dirty="0"/>
+          </a:p>
+        </p:txBody>
+      </p:sp>
+      <p:pic>
+        <p:nvPicPr>
+          <p:cNvPr id="5" name="Kép 4">
+            <a:extLst>
+              <a:ext uri="{FF2B5EF4-FFF2-40B4-BE49-F238E27FC236}">
+                <a16:creationId xmlns:a16="http://schemas.microsoft.com/office/drawing/2014/main" id="{C6AB3377-8127-99D0-4C45-A63402BF028A}"/>
+              </a:ext>
+            </a:extLst>
+          </p:cNvPr>
+          <p:cNvPicPr>
+            <a:picLocks noChangeAspect="1"/>
+          </p:cNvPicPr>
+          <p:nvPr/>
+        </p:nvPicPr>
+        <p:blipFill>
+          <a:blip r:embed="rId2"/>
+          <a:stretch>
+            <a:fillRect/>
+          </a:stretch>
+        </p:blipFill>
+        <p:spPr>
+          <a:xfrm>
+            <a:off x="3636817" y="1826251"/>
+            <a:ext cx="3964555" cy="3160423"/>
+          </a:xfrm>
+          <a:prstGeom prst="rect">
+            <a:avLst/>
+          </a:prstGeom>
+        </p:spPr>
+      </p:pic>
+      <p:pic>
+        <p:nvPicPr>
+          <p:cNvPr id="7" name="Kép 6">
+            <a:extLst>
+              <a:ext uri="{FF2B5EF4-FFF2-40B4-BE49-F238E27FC236}">
+                <a16:creationId xmlns:a16="http://schemas.microsoft.com/office/drawing/2014/main" id="{C039C9C4-A6DC-966A-DDD2-752E57F2C9AD}"/>
+              </a:ext>
+            </a:extLst>
+          </p:cNvPr>
+          <p:cNvPicPr>
+            <a:picLocks noChangeAspect="1"/>
+          </p:cNvPicPr>
+          <p:nvPr/>
+        </p:nvPicPr>
+        <p:blipFill>
+          <a:blip r:embed="rId3"/>
+          <a:stretch>
+            <a:fillRect/>
+          </a:stretch>
+        </p:blipFill>
+        <p:spPr>
+          <a:xfrm>
+            <a:off x="6386285" y="574625"/>
+            <a:ext cx="2127679" cy="1702143"/>
+          </a:xfrm>
+          <a:prstGeom prst="rect">
+            <a:avLst/>
+          </a:prstGeom>
+        </p:spPr>
+      </p:pic>
+      <p:pic>
+        <p:nvPicPr>
+          <p:cNvPr id="11" name="Kép 10">
+            <a:extLst>
+              <a:ext uri="{FF2B5EF4-FFF2-40B4-BE49-F238E27FC236}">
+                <a16:creationId xmlns:a16="http://schemas.microsoft.com/office/drawing/2014/main" id="{04DF4CF8-B1B1-CD75-F7C1-0702ADE39F6C}"/>
+              </a:ext>
+            </a:extLst>
+          </p:cNvPr>
+          <p:cNvPicPr>
+            <a:picLocks noChangeAspect="1"/>
+          </p:cNvPicPr>
+          <p:nvPr/>
+        </p:nvPicPr>
+        <p:blipFill>
+          <a:blip r:embed="rId4"/>
+          <a:stretch>
+            <a:fillRect/>
+          </a:stretch>
+        </p:blipFill>
+        <p:spPr>
+          <a:xfrm>
+            <a:off x="460582" y="1752820"/>
+            <a:ext cx="2857899" cy="1047896"/>
+          </a:xfrm>
+          <a:prstGeom prst="rect">
+            <a:avLst/>
+          </a:prstGeom>
+          <a:ln>
+            <a:solidFill>
+              <a:schemeClr val="accent1"/>
+            </a:solidFill>
+          </a:ln>
+        </p:spPr>
+      </p:pic>
+      <p:pic>
+        <p:nvPicPr>
+          <p:cNvPr id="13" name="Kép 12">
+            <a:extLst>
+              <a:ext uri="{FF2B5EF4-FFF2-40B4-BE49-F238E27FC236}">
+                <a16:creationId xmlns:a16="http://schemas.microsoft.com/office/drawing/2014/main" id="{7B6DC51E-4356-9CA1-0CFF-20E17F440141}"/>
+              </a:ext>
+            </a:extLst>
+          </p:cNvPr>
+          <p:cNvPicPr>
+            <a:picLocks noChangeAspect="1"/>
+          </p:cNvPicPr>
+          <p:nvPr/>
+        </p:nvPicPr>
+        <p:blipFill>
+          <a:blip r:embed="rId5"/>
+          <a:stretch>
+            <a:fillRect/>
+          </a:stretch>
+        </p:blipFill>
+        <p:spPr>
+          <a:xfrm>
+            <a:off x="576834" y="3401061"/>
+            <a:ext cx="1829055" cy="1181265"/>
+          </a:xfrm>
+          <a:prstGeom prst="rect">
+            <a:avLst/>
+          </a:prstGeom>
+        </p:spPr>
+      </p:pic>
+    </p:spTree>
+    <p:extLst>
+      <p:ext uri="{BB962C8B-B14F-4D97-AF65-F5344CB8AC3E}">
+        <p14:creationId xmlns:p14="http://schemas.microsoft.com/office/powerpoint/2010/main" val="3018647018"/>
+      </p:ext>
+    </p:extLst>
+  </p:cSld>
+  <p:clrMapOvr>
+    <a:masterClrMapping/>
+  </p:clrMapOvr>
+</p:sld>
+</file>
+
+<file path=ppt/slides/slide22.xml><?xml version="1.0" encoding="utf-8"?>
+<p:sld xmlns:a="http://schemas.openxmlformats.org/drawingml/2006/main" xmlns:r="http://schemas.openxmlformats.org/officeDocument/2006/relationships" xmlns:p="http://schemas.openxmlformats.org/presentationml/2006/main">
+  <p:cSld>
+    <p:spTree>
+      <p:nvGrpSpPr>
+        <p:cNvPr id="1" name=""/>
+        <p:cNvGrpSpPr/>
+        <p:nvPr/>
+      </p:nvGrpSpPr>
+      <p:grpSpPr>
+        <a:xfrm>
+          <a:off x="0" y="0"/>
+          <a:ext cx="0" cy="0"/>
+          <a:chOff x="0" y="0"/>
+          <a:chExt cx="0" cy="0"/>
+        </a:xfrm>
+      </p:grpSpPr>
+      <p:sp>
+        <p:nvSpPr>
+          <p:cNvPr id="2" name="Cím 1">
+            <a:extLst>
+              <a:ext uri="{FF2B5EF4-FFF2-40B4-BE49-F238E27FC236}">
+                <a16:creationId xmlns:a16="http://schemas.microsoft.com/office/drawing/2014/main" id="{1DEB7EEC-F24A-852F-1EFD-DAB932FE4BE2}"/>
+              </a:ext>
+            </a:extLst>
+          </p:cNvPr>
+          <p:cNvSpPr>
+            <a:spLocks noGrp="1"/>
+          </p:cNvSpPr>
+          <p:nvPr>
+            <p:ph type="title"/>
+          </p:nvPr>
+        </p:nvSpPr>
+        <p:spPr/>
+        <p:txBody>
+          <a:bodyPr>
+            <a:normAutofit fontScale="90000"/>
+          </a:bodyPr>
+          <a:lstStyle/>
+          <a:p>
+            <a:r>
+              <a:rPr lang="hu-HU" dirty="0"/>
+              <a:t>Mi a lista</a:t>
+            </a:r>
+            <a:endParaRPr lang="en-US" dirty="0"/>
+          </a:p>
+        </p:txBody>
+      </p:sp>
+      <p:sp>
+        <p:nvSpPr>
+          <p:cNvPr id="3" name="Szöveg helye 2">
+            <a:extLst>
+              <a:ext uri="{FF2B5EF4-FFF2-40B4-BE49-F238E27FC236}">
+                <a16:creationId xmlns:a16="http://schemas.microsoft.com/office/drawing/2014/main" id="{A5B67A3E-EFB0-5865-42AC-A947E00C0C2E}"/>
+              </a:ext>
+            </a:extLst>
+          </p:cNvPr>
+          <p:cNvSpPr>
+            <a:spLocks noGrp="1"/>
+          </p:cNvSpPr>
+          <p:nvPr>
+            <p:ph type="body" idx="1"/>
+          </p:nvPr>
+        </p:nvSpPr>
+        <p:spPr/>
+        <p:txBody>
+          <a:bodyPr/>
+          <a:lstStyle/>
+          <a:p>
+            <a:r>
+              <a:rPr lang="hu-HU" dirty="0"/>
+              <a:t>A listában több elemet tudunk egyetlen változóban eltárolni.</a:t>
+            </a:r>
+          </a:p>
+          <a:p>
+            <a:r>
+              <a:rPr lang="hu-HU" dirty="0"/>
+              <a:t>A listához </a:t>
+            </a:r>
+          </a:p>
+          <a:p>
+            <a:pPr lvl="1"/>
+            <a:r>
+              <a:rPr lang="hu-HU" dirty="0"/>
+              <a:t>hozzá tudunk fűzni egy elemet (</a:t>
+            </a:r>
+            <a:r>
+              <a:rPr lang="hu-HU" b="1" dirty="0" err="1"/>
+              <a:t>C</a:t>
+            </a:r>
+            <a:r>
+              <a:rPr lang="hu-HU" dirty="0" err="1"/>
+              <a:t>reate</a:t>
+            </a:r>
+            <a:r>
+              <a:rPr lang="hu-HU" dirty="0"/>
+              <a:t>), </a:t>
+            </a:r>
+          </a:p>
+          <a:p>
+            <a:pPr lvl="1"/>
+            <a:r>
+              <a:rPr lang="hu-HU" dirty="0"/>
+              <a:t>hivatkozni tudunk rá a sorszáma szerint (</a:t>
+            </a:r>
+            <a:r>
+              <a:rPr lang="hu-HU" b="1" dirty="0"/>
+              <a:t>R</a:t>
+            </a:r>
+            <a:r>
+              <a:rPr lang="hu-HU" dirty="0"/>
+              <a:t>ead)</a:t>
+            </a:r>
+          </a:p>
+          <a:p>
+            <a:pPr lvl="1"/>
+            <a:r>
+              <a:rPr lang="hu-HU" dirty="0"/>
+              <a:t>Módosítani tudjuk bármely elemét (</a:t>
+            </a:r>
+            <a:r>
+              <a:rPr lang="hu-HU" b="1" dirty="0"/>
+              <a:t>U</a:t>
+            </a:r>
+            <a:r>
+              <a:rPr lang="hu-HU" dirty="0"/>
+              <a:t>pdate)</a:t>
+            </a:r>
+          </a:p>
+          <a:p>
+            <a:pPr lvl="1"/>
+            <a:r>
+              <a:rPr lang="hu-HU" dirty="0"/>
+              <a:t>Törölni tudunk belőle elemet (</a:t>
+            </a:r>
+            <a:r>
+              <a:rPr lang="hu-HU" b="1" dirty="0" err="1"/>
+              <a:t>D</a:t>
+            </a:r>
+            <a:r>
+              <a:rPr lang="hu-HU" dirty="0" err="1"/>
+              <a:t>elete</a:t>
+            </a:r>
+            <a:r>
+              <a:rPr lang="hu-HU" dirty="0"/>
+              <a:t>)</a:t>
+            </a:r>
+          </a:p>
+          <a:p>
+            <a:r>
+              <a:rPr lang="hu-HU" dirty="0"/>
+              <a:t>Ezeket a műveleteket nevezzük CRUD műveleteknek.</a:t>
+            </a:r>
+          </a:p>
+          <a:p>
+            <a:r>
+              <a:rPr lang="hu-HU" dirty="0"/>
+              <a:t>Tudj meg többet: </a:t>
+            </a:r>
+            <a:r>
+              <a:rPr lang="en-US" dirty="0">
+                <a:hlinkClick r:id="rId2"/>
+              </a:rPr>
+              <a:t>Python Lists</a:t>
+            </a:r>
+            <a:endParaRPr lang="hu-HU" dirty="0"/>
+          </a:p>
+          <a:p>
+            <a:pPr lvl="1"/>
+            <a:endParaRPr lang="hu-HU" dirty="0"/>
+          </a:p>
+          <a:p>
+            <a:pPr marL="139700" indent="0">
+              <a:buNone/>
+            </a:pPr>
+            <a:endParaRPr lang="en-US" dirty="0"/>
+          </a:p>
+        </p:txBody>
+      </p:sp>
+    </p:spTree>
+    <p:extLst>
+      <p:ext uri="{BB962C8B-B14F-4D97-AF65-F5344CB8AC3E}">
+        <p14:creationId xmlns:p14="http://schemas.microsoft.com/office/powerpoint/2010/main" val="1041132644"/>
+      </p:ext>
+    </p:extLst>
+  </p:cSld>
+  <p:clrMapOvr>
+    <a:masterClrMapping/>
+  </p:clrMapOvr>
+</p:sld>
+</file>
+
+<file path=ppt/slides/slide23.xml><?xml version="1.0" encoding="utf-8"?>
+<p:sld xmlns:a="http://schemas.openxmlformats.org/drawingml/2006/main" xmlns:r="http://schemas.openxmlformats.org/officeDocument/2006/relationships" xmlns:p="http://schemas.openxmlformats.org/presentationml/2006/main">
+  <p:cSld>
+    <p:spTree>
+      <p:nvGrpSpPr>
+        <p:cNvPr id="1" name=""/>
+        <p:cNvGrpSpPr/>
+        <p:nvPr/>
+      </p:nvGrpSpPr>
+      <p:grpSpPr>
+        <a:xfrm>
+          <a:off x="0" y="0"/>
+          <a:ext cx="0" cy="0"/>
+          <a:chOff x="0" y="0"/>
+          <a:chExt cx="0" cy="0"/>
+        </a:xfrm>
+      </p:grpSpPr>
+      <p:sp>
+        <p:nvSpPr>
+          <p:cNvPr id="2" name="Cím 1">
+            <a:extLst>
+              <a:ext uri="{FF2B5EF4-FFF2-40B4-BE49-F238E27FC236}">
+                <a16:creationId xmlns:a16="http://schemas.microsoft.com/office/drawing/2014/main" id="{0554498B-8358-E829-8C56-658A2F9A29CA}"/>
+              </a:ext>
+            </a:extLst>
+          </p:cNvPr>
+          <p:cNvSpPr>
+            <a:spLocks noGrp="1"/>
+          </p:cNvSpPr>
+          <p:nvPr>
+            <p:ph type="title"/>
+          </p:nvPr>
+        </p:nvSpPr>
+        <p:spPr/>
+        <p:txBody>
+          <a:bodyPr>
+            <a:normAutofit fontScale="90000"/>
+          </a:bodyPr>
+          <a:lstStyle/>
+          <a:p>
+            <a:r>
+              <a:rPr lang="hu-HU" dirty="0"/>
+              <a:t>Műveletek a listával</a:t>
+            </a:r>
+            <a:endParaRPr lang="en-US" dirty="0"/>
+          </a:p>
+        </p:txBody>
+      </p:sp>
+      <p:pic>
+        <p:nvPicPr>
+          <p:cNvPr id="5" name="Kép 4">
+            <a:extLst>
+              <a:ext uri="{FF2B5EF4-FFF2-40B4-BE49-F238E27FC236}">
+                <a16:creationId xmlns:a16="http://schemas.microsoft.com/office/drawing/2014/main" id="{65263341-9AF7-14E3-32AF-71B7839DC7DA}"/>
+              </a:ext>
+            </a:extLst>
+          </p:cNvPr>
+          <p:cNvPicPr>
+            <a:picLocks noChangeAspect="1"/>
+          </p:cNvPicPr>
+          <p:nvPr/>
+        </p:nvPicPr>
+        <p:blipFill>
+          <a:blip r:embed="rId2"/>
+          <a:stretch>
+            <a:fillRect/>
+          </a:stretch>
+        </p:blipFill>
+        <p:spPr>
+          <a:xfrm>
+            <a:off x="4436269" y="1017450"/>
+            <a:ext cx="3717498" cy="3427384"/>
+          </a:xfrm>
+          <a:prstGeom prst="rect">
+            <a:avLst/>
+          </a:prstGeom>
+        </p:spPr>
+      </p:pic>
+      <p:pic>
+        <p:nvPicPr>
+          <p:cNvPr id="7" name="Kép 6">
+            <a:extLst>
+              <a:ext uri="{FF2B5EF4-FFF2-40B4-BE49-F238E27FC236}">
+                <a16:creationId xmlns:a16="http://schemas.microsoft.com/office/drawing/2014/main" id="{C3240125-A276-95C2-249C-E00815E19D05}"/>
+              </a:ext>
+            </a:extLst>
+          </p:cNvPr>
+          <p:cNvPicPr>
+            <a:picLocks noChangeAspect="1"/>
+          </p:cNvPicPr>
+          <p:nvPr/>
+        </p:nvPicPr>
+        <p:blipFill>
+          <a:blip r:embed="rId3"/>
+          <a:stretch>
+            <a:fillRect/>
+          </a:stretch>
+        </p:blipFill>
+        <p:spPr>
+          <a:xfrm>
+            <a:off x="6980899" y="560687"/>
+            <a:ext cx="1512134" cy="1239538"/>
+          </a:xfrm>
+          <a:prstGeom prst="rect">
+            <a:avLst/>
+          </a:prstGeom>
+        </p:spPr>
+      </p:pic>
+      <p:pic>
+        <p:nvPicPr>
+          <p:cNvPr id="9" name="Kép 8">
+            <a:extLst>
+              <a:ext uri="{FF2B5EF4-FFF2-40B4-BE49-F238E27FC236}">
+                <a16:creationId xmlns:a16="http://schemas.microsoft.com/office/drawing/2014/main" id="{6A9C2935-40A7-AFF6-1631-1AFC27A5D418}"/>
+              </a:ext>
+            </a:extLst>
+          </p:cNvPr>
+          <p:cNvPicPr>
+            <a:picLocks noChangeAspect="1"/>
+          </p:cNvPicPr>
+          <p:nvPr/>
+        </p:nvPicPr>
+        <p:blipFill>
+          <a:blip r:embed="rId4"/>
+          <a:stretch>
+            <a:fillRect/>
+          </a:stretch>
+        </p:blipFill>
+        <p:spPr>
+          <a:xfrm>
+            <a:off x="454650" y="1161853"/>
+            <a:ext cx="2419688" cy="1409897"/>
+          </a:xfrm>
+          <a:prstGeom prst="rect">
+            <a:avLst/>
+          </a:prstGeom>
+          <a:ln>
+            <a:solidFill>
+              <a:schemeClr val="accent1"/>
+            </a:solidFill>
+          </a:ln>
+        </p:spPr>
+      </p:pic>
+      <p:pic>
+        <p:nvPicPr>
+          <p:cNvPr id="11" name="Kép 10">
+            <a:extLst>
+              <a:ext uri="{FF2B5EF4-FFF2-40B4-BE49-F238E27FC236}">
+                <a16:creationId xmlns:a16="http://schemas.microsoft.com/office/drawing/2014/main" id="{6774104A-9781-7221-1F07-1FB0AE098B54}"/>
+              </a:ext>
+            </a:extLst>
+          </p:cNvPr>
+          <p:cNvPicPr>
+            <a:picLocks noChangeAspect="1"/>
+          </p:cNvPicPr>
+          <p:nvPr/>
+        </p:nvPicPr>
+        <p:blipFill>
+          <a:blip r:embed="rId5"/>
+          <a:stretch>
+            <a:fillRect/>
+          </a:stretch>
+        </p:blipFill>
+        <p:spPr>
+          <a:xfrm>
+            <a:off x="626124" y="3417207"/>
+            <a:ext cx="2248214" cy="600159"/>
+          </a:xfrm>
+          <a:prstGeom prst="rect">
+            <a:avLst/>
+          </a:prstGeom>
+        </p:spPr>
+      </p:pic>
+    </p:spTree>
+    <p:extLst>
+      <p:ext uri="{BB962C8B-B14F-4D97-AF65-F5344CB8AC3E}">
+        <p14:creationId xmlns:p14="http://schemas.microsoft.com/office/powerpoint/2010/main" val="806026489"/>
+      </p:ext>
+    </p:extLst>
+  </p:cSld>
+  <p:clrMapOvr>
+    <a:masterClrMapping/>
+  </p:clrMapOvr>
+</p:sld>
+</file>
+
+<file path=ppt/slides/slide24.xml><?xml version="1.0" encoding="utf-8"?>
+<p:sld xmlns:a="http://schemas.openxmlformats.org/drawingml/2006/main" xmlns:r="http://schemas.openxmlformats.org/officeDocument/2006/relationships" xmlns:p="http://schemas.openxmlformats.org/presentationml/2006/main">
+  <p:cSld>
+    <p:spTree>
+      <p:nvGrpSpPr>
+        <p:cNvPr id="1" name=""/>
+        <p:cNvGrpSpPr/>
+        <p:nvPr/>
+      </p:nvGrpSpPr>
+      <p:grpSpPr>
+        <a:xfrm>
+          <a:off x="0" y="0"/>
+          <a:ext cx="0" cy="0"/>
+          <a:chOff x="0" y="0"/>
+          <a:chExt cx="0" cy="0"/>
+        </a:xfrm>
+      </p:grpSpPr>
+      <p:sp>
+        <p:nvSpPr>
+          <p:cNvPr id="2" name="Cím 1">
+            <a:extLst>
+              <a:ext uri="{FF2B5EF4-FFF2-40B4-BE49-F238E27FC236}">
+                <a16:creationId xmlns:a16="http://schemas.microsoft.com/office/drawing/2014/main" id="{E5C9E1F5-B218-EC86-13BB-0F13652C762C}"/>
+              </a:ext>
+            </a:extLst>
+          </p:cNvPr>
+          <p:cNvSpPr>
+            <a:spLocks noGrp="1"/>
+          </p:cNvSpPr>
+          <p:nvPr>
+            <p:ph type="title"/>
+          </p:nvPr>
+        </p:nvSpPr>
+        <p:spPr/>
+        <p:txBody>
+          <a:bodyPr>
+            <a:normAutofit fontScale="90000"/>
+          </a:bodyPr>
+          <a:lstStyle/>
+          <a:p>
+            <a:r>
+              <a:rPr lang="hu-HU" dirty="0"/>
+              <a:t>Lista bejárása ciklussal</a:t>
+            </a:r>
+            <a:endParaRPr lang="en-US" dirty="0"/>
+          </a:p>
+        </p:txBody>
+      </p:sp>
+      <p:pic>
+        <p:nvPicPr>
+          <p:cNvPr id="7" name="Kép 6">
+            <a:extLst>
+              <a:ext uri="{FF2B5EF4-FFF2-40B4-BE49-F238E27FC236}">
+                <a16:creationId xmlns:a16="http://schemas.microsoft.com/office/drawing/2014/main" id="{4736A5D4-B274-BFC6-D8E9-9F791CD44B7B}"/>
+              </a:ext>
+            </a:extLst>
+          </p:cNvPr>
+          <p:cNvPicPr>
+            <a:picLocks noChangeAspect="1"/>
+          </p:cNvPicPr>
+          <p:nvPr/>
+        </p:nvPicPr>
+        <p:blipFill>
+          <a:blip r:embed="rId2"/>
+          <a:stretch>
+            <a:fillRect/>
+          </a:stretch>
+        </p:blipFill>
+        <p:spPr>
+          <a:xfrm>
+            <a:off x="4160340" y="900112"/>
+            <a:ext cx="3951792" cy="3852037"/>
+          </a:xfrm>
+          <a:prstGeom prst="rect">
+            <a:avLst/>
+          </a:prstGeom>
+        </p:spPr>
+      </p:pic>
+      <p:pic>
+        <p:nvPicPr>
+          <p:cNvPr id="9" name="Kép 8">
+            <a:extLst>
+              <a:ext uri="{FF2B5EF4-FFF2-40B4-BE49-F238E27FC236}">
+                <a16:creationId xmlns:a16="http://schemas.microsoft.com/office/drawing/2014/main" id="{67864A1D-2776-B0CF-5512-7EA7F00C2BC9}"/>
+              </a:ext>
+            </a:extLst>
+          </p:cNvPr>
+          <p:cNvPicPr>
+            <a:picLocks noChangeAspect="1"/>
+          </p:cNvPicPr>
+          <p:nvPr/>
+        </p:nvPicPr>
+        <p:blipFill>
+          <a:blip r:embed="rId3"/>
+          <a:stretch>
+            <a:fillRect/>
+          </a:stretch>
+        </p:blipFill>
+        <p:spPr>
+          <a:xfrm>
+            <a:off x="7040355" y="391350"/>
+            <a:ext cx="1791945" cy="1438432"/>
+          </a:xfrm>
+          <a:prstGeom prst="rect">
+            <a:avLst/>
+          </a:prstGeom>
+        </p:spPr>
+      </p:pic>
+      <p:pic>
+        <p:nvPicPr>
+          <p:cNvPr id="11" name="Kép 10">
+            <a:extLst>
+              <a:ext uri="{FF2B5EF4-FFF2-40B4-BE49-F238E27FC236}">
+                <a16:creationId xmlns:a16="http://schemas.microsoft.com/office/drawing/2014/main" id="{3AAFA9EE-1A17-E7B6-26F1-41EDD117BE63}"/>
+              </a:ext>
+            </a:extLst>
+          </p:cNvPr>
+          <p:cNvPicPr>
+            <a:picLocks noChangeAspect="1"/>
+          </p:cNvPicPr>
+          <p:nvPr/>
+        </p:nvPicPr>
+        <p:blipFill>
+          <a:blip r:embed="rId4"/>
+          <a:stretch>
+            <a:fillRect/>
+          </a:stretch>
+        </p:blipFill>
+        <p:spPr>
+          <a:xfrm>
+            <a:off x="453289" y="1173880"/>
+            <a:ext cx="2876951" cy="1095528"/>
+          </a:xfrm>
+          <a:prstGeom prst="rect">
+            <a:avLst/>
+          </a:prstGeom>
+          <a:ln>
+            <a:solidFill>
+              <a:schemeClr val="accent1"/>
+            </a:solidFill>
+          </a:ln>
+        </p:spPr>
+      </p:pic>
+      <p:pic>
+        <p:nvPicPr>
+          <p:cNvPr id="13" name="Kép 12">
+            <a:extLst>
+              <a:ext uri="{FF2B5EF4-FFF2-40B4-BE49-F238E27FC236}">
+                <a16:creationId xmlns:a16="http://schemas.microsoft.com/office/drawing/2014/main" id="{6DDEE05F-0F0A-1174-6A46-89D326E863BC}"/>
+              </a:ext>
+            </a:extLst>
+          </p:cNvPr>
+          <p:cNvPicPr>
+            <a:picLocks noChangeAspect="1"/>
+          </p:cNvPicPr>
+          <p:nvPr/>
+        </p:nvPicPr>
+        <p:blipFill>
+          <a:blip r:embed="rId5"/>
+          <a:stretch>
+            <a:fillRect/>
+          </a:stretch>
+        </p:blipFill>
+        <p:spPr>
+          <a:xfrm>
+            <a:off x="453289" y="3360944"/>
+            <a:ext cx="2991267" cy="638264"/>
+          </a:xfrm>
+          <a:prstGeom prst="rect">
+            <a:avLst/>
+          </a:prstGeom>
+          <a:ln>
+            <a:solidFill>
+              <a:schemeClr val="accent1"/>
+            </a:solidFill>
+          </a:ln>
+        </p:spPr>
+      </p:pic>
+      <p:pic>
+        <p:nvPicPr>
+          <p:cNvPr id="15" name="Kép 14">
+            <a:extLst>
+              <a:ext uri="{FF2B5EF4-FFF2-40B4-BE49-F238E27FC236}">
+                <a16:creationId xmlns:a16="http://schemas.microsoft.com/office/drawing/2014/main" id="{C531A185-B4F8-631C-CBC1-66DA023BE7C1}"/>
+              </a:ext>
+            </a:extLst>
+          </p:cNvPr>
+          <p:cNvPicPr>
+            <a:picLocks noChangeAspect="1"/>
+          </p:cNvPicPr>
+          <p:nvPr/>
+        </p:nvPicPr>
+        <p:blipFill>
+          <a:blip r:embed="rId6"/>
+          <a:stretch>
+            <a:fillRect/>
+          </a:stretch>
+        </p:blipFill>
+        <p:spPr>
+          <a:xfrm>
+            <a:off x="453289" y="2531728"/>
+            <a:ext cx="2838846" cy="590632"/>
+          </a:xfrm>
+          <a:prstGeom prst="rect">
+            <a:avLst/>
+          </a:prstGeom>
+          <a:ln>
+            <a:solidFill>
+              <a:schemeClr val="accent1"/>
+            </a:solidFill>
+          </a:ln>
+        </p:spPr>
+      </p:pic>
+    </p:spTree>
+    <p:extLst>
+      <p:ext uri="{BB962C8B-B14F-4D97-AF65-F5344CB8AC3E}">
+        <p14:creationId xmlns:p14="http://schemas.microsoft.com/office/powerpoint/2010/main" val="3947226389"/>
+      </p:ext>
+    </p:extLst>
+  </p:cSld>
+  <p:clrMapOvr>
+    <a:masterClrMapping/>
+  </p:clrMapOvr>
+</p:sld>
+</file>
+
+<file path=ppt/slides/slide25.xml><?xml version="1.0" encoding="utf-8"?>
+<p:sld xmlns:a="http://schemas.openxmlformats.org/drawingml/2006/main" xmlns:r="http://schemas.openxmlformats.org/officeDocument/2006/relationships" xmlns:p="http://schemas.openxmlformats.org/presentationml/2006/main">
+  <p:cSld>
+    <p:spTree>
+      <p:nvGrpSpPr>
         <p:cNvPr id="1" name="Shape 132"/>
         <p:cNvGrpSpPr/>
         <p:nvPr/>
@@ -11085,7 +11908,7 @@
 </p:sld>
 </file>
 
-<file path=ppt/slides/slide22.xml><?xml version="1.0" encoding="utf-8"?>
+<file path=ppt/slides/slide26.xml><?xml version="1.0" encoding="utf-8"?>
 <p:sld xmlns:a="http://schemas.openxmlformats.org/drawingml/2006/main" xmlns:r="http://schemas.openxmlformats.org/officeDocument/2006/relationships" xmlns:p="http://schemas.openxmlformats.org/presentationml/2006/main">
   <p:cSld>
     <p:spTree>
@@ -11208,7 +12031,7 @@
 </p:sld>
 </file>
 
-<file path=ppt/slides/slide23.xml><?xml version="1.0" encoding="utf-8"?>
+<file path=ppt/slides/slide27.xml><?xml version="1.0" encoding="utf-8"?>
 <p:sld xmlns:a="http://schemas.openxmlformats.org/drawingml/2006/main" xmlns:r="http://schemas.openxmlformats.org/officeDocument/2006/relationships" xmlns:p="http://schemas.openxmlformats.org/presentationml/2006/main">
   <p:cSld>
     <p:spTree>
@@ -11303,7 +12126,7 @@
 </p:sld>
 </file>
 
-<file path=ppt/slides/slide24.xml><?xml version="1.0" encoding="utf-8"?>
+<file path=ppt/slides/slide28.xml><?xml version="1.0" encoding="utf-8"?>
 <p:sld xmlns:a="http://schemas.openxmlformats.org/drawingml/2006/main" xmlns:r="http://schemas.openxmlformats.org/officeDocument/2006/relationships" xmlns:p="http://schemas.openxmlformats.org/presentationml/2006/main">
   <p:cSld>
     <p:spTree>
@@ -11452,7 +12275,7 @@
 </p:sld>
 </file>
 
-<file path=ppt/slides/slide25.xml><?xml version="1.0" encoding="utf-8"?>
+<file path=ppt/slides/slide29.xml><?xml version="1.0" encoding="utf-8"?>
 <p:sld xmlns:a="http://schemas.openxmlformats.org/drawingml/2006/main" xmlns:r="http://schemas.openxmlformats.org/officeDocument/2006/relationships" xmlns:p="http://schemas.openxmlformats.org/presentationml/2006/main">
   <p:cSld>
     <p:spTree>
@@ -11593,501 +12416,6 @@
           </a:ln>
         </p:spPr>
       </p:pic>
-    </p:spTree>
-  </p:cSld>
-  <p:clrMapOvr>
-    <a:masterClrMapping/>
-  </p:clrMapOvr>
-</p:sld>
-</file>
-
-<file path=ppt/slides/slide26.xml><?xml version="1.0" encoding="utf-8"?>
-<p:sld xmlns:a="http://schemas.openxmlformats.org/drawingml/2006/main" xmlns:r="http://schemas.openxmlformats.org/officeDocument/2006/relationships" xmlns:p="http://schemas.openxmlformats.org/presentationml/2006/main">
-  <p:cSld>
-    <p:spTree>
-      <p:nvGrpSpPr>
-        <p:cNvPr id="1" name="Shape 166"/>
-        <p:cNvGrpSpPr/>
-        <p:nvPr/>
-      </p:nvGrpSpPr>
-      <p:grpSpPr>
-        <a:xfrm>
-          <a:off x="0" y="0"/>
-          <a:ext cx="0" cy="0"/>
-          <a:chOff x="0" y="0"/>
-          <a:chExt cx="0" cy="0"/>
-        </a:xfrm>
-      </p:grpSpPr>
-      <p:sp>
-        <p:nvSpPr>
-          <p:cNvPr id="167" name="Google Shape;167;p29"/>
-          <p:cNvSpPr txBox="1">
-            <a:spLocks noGrp="1"/>
-          </p:cNvSpPr>
-          <p:nvPr>
-            <p:ph type="title"/>
-          </p:nvPr>
-        </p:nvSpPr>
-        <p:spPr>
-          <a:xfrm>
-            <a:off x="311700" y="391350"/>
-            <a:ext cx="8520600" cy="626100"/>
-          </a:xfrm>
-          <a:prstGeom prst="rect">
-            <a:avLst/>
-          </a:prstGeom>
-        </p:spPr>
-        <p:txBody>
-          <a:bodyPr spcFirstLastPara="1" wrap="square" lIns="91425" tIns="91425" rIns="91425" bIns="91425" anchor="t" anchorCtr="0">
-            <a:normAutofit fontScale="90000"/>
-          </a:bodyPr>
-          <a:lstStyle/>
-          <a:p>
-            <a:pPr marL="0" lvl="0" indent="0" algn="l" rtl="0">
-              <a:spcBef>
-                <a:spcPts val="0"/>
-              </a:spcBef>
-              <a:spcAft>
-                <a:spcPts val="0"/>
-              </a:spcAft>
-              <a:buNone/>
-            </a:pPr>
-            <a:r>
-              <a:rPr lang="hu"/>
-              <a:t>Jelszó generátor</a:t>
-            </a:r>
-            <a:endParaRPr/>
-          </a:p>
-        </p:txBody>
-      </p:sp>
-      <p:pic>
-        <p:nvPicPr>
-          <p:cNvPr id="168" name="Google Shape;168;p29"/>
-          <p:cNvPicPr preferRelativeResize="0"/>
-          <p:nvPr/>
-        </p:nvPicPr>
-        <p:blipFill>
-          <a:blip r:embed="rId3">
-            <a:alphaModFix/>
-          </a:blip>
-          <a:stretch>
-            <a:fillRect/>
-          </a:stretch>
-        </p:blipFill>
-        <p:spPr>
-          <a:xfrm>
-            <a:off x="2867450" y="867475"/>
-            <a:ext cx="5565539" cy="3820975"/>
-          </a:xfrm>
-          <a:prstGeom prst="rect">
-            <a:avLst/>
-          </a:prstGeom>
-          <a:noFill/>
-          <a:ln>
-            <a:noFill/>
-          </a:ln>
-        </p:spPr>
-      </p:pic>
-      <p:sp>
-        <p:nvSpPr>
-          <p:cNvPr id="169" name="Google Shape;169;p29"/>
-          <p:cNvSpPr txBox="1"/>
-          <p:nvPr/>
-        </p:nvSpPr>
-        <p:spPr>
-          <a:xfrm>
-            <a:off x="401475" y="1265950"/>
-            <a:ext cx="2350200" cy="2697300"/>
-          </a:xfrm>
-          <a:prstGeom prst="rect">
-            <a:avLst/>
-          </a:prstGeom>
-          <a:noFill/>
-          <a:ln>
-            <a:noFill/>
-          </a:ln>
-        </p:spPr>
-        <p:txBody>
-          <a:bodyPr spcFirstLastPara="1" wrap="square" lIns="91425" tIns="91425" rIns="91425" bIns="91425" anchor="t" anchorCtr="0">
-            <a:noAutofit/>
-          </a:bodyPr>
-          <a:lstStyle/>
-          <a:p>
-            <a:pPr marL="0" lvl="0" indent="0" algn="l" rtl="0">
-              <a:spcBef>
-                <a:spcPts val="0"/>
-              </a:spcBef>
-              <a:spcAft>
-                <a:spcPts val="0"/>
-              </a:spcAft>
-              <a:buNone/>
-            </a:pPr>
-            <a:r>
-              <a:rPr lang="hu" sz="1600">
-                <a:solidFill>
-                  <a:srgbClr val="404040"/>
-                </a:solidFill>
-                <a:latin typeface="Roboto"/>
-                <a:ea typeface="Roboto"/>
-                <a:cs typeface="Roboto"/>
-                <a:sym typeface="Roboto"/>
-              </a:rPr>
-              <a:t>Egy egyszerű jelszó generátor, amely véletlenszerű jelszót hoz létre.</a:t>
-            </a:r>
-            <a:endParaRPr sz="2600">
-              <a:solidFill>
-                <a:schemeClr val="dk2"/>
-              </a:solidFill>
-            </a:endParaRPr>
-          </a:p>
-        </p:txBody>
-      </p:sp>
-    </p:spTree>
-  </p:cSld>
-  <p:clrMapOvr>
-    <a:masterClrMapping/>
-  </p:clrMapOvr>
-</p:sld>
-</file>
-
-<file path=ppt/slides/slide27.xml><?xml version="1.0" encoding="utf-8"?>
-<p:sld xmlns:a="http://schemas.openxmlformats.org/drawingml/2006/main" xmlns:r="http://schemas.openxmlformats.org/officeDocument/2006/relationships" xmlns:p="http://schemas.openxmlformats.org/presentationml/2006/main">
-  <p:cSld>
-    <p:spTree>
-      <p:nvGrpSpPr>
-        <p:cNvPr id="1" name="Shape 173"/>
-        <p:cNvGrpSpPr/>
-        <p:nvPr/>
-      </p:nvGrpSpPr>
-      <p:grpSpPr>
-        <a:xfrm>
-          <a:off x="0" y="0"/>
-          <a:ext cx="0" cy="0"/>
-          <a:chOff x="0" y="0"/>
-          <a:chExt cx="0" cy="0"/>
-        </a:xfrm>
-      </p:grpSpPr>
-      <p:sp>
-        <p:nvSpPr>
-          <p:cNvPr id="174" name="Google Shape;174;p30"/>
-          <p:cNvSpPr txBox="1">
-            <a:spLocks noGrp="1"/>
-          </p:cNvSpPr>
-          <p:nvPr>
-            <p:ph type="title"/>
-          </p:nvPr>
-        </p:nvSpPr>
-        <p:spPr>
-          <a:xfrm>
-            <a:off x="311700" y="391350"/>
-            <a:ext cx="8520600" cy="626100"/>
-          </a:xfrm>
-          <a:prstGeom prst="rect">
-            <a:avLst/>
-          </a:prstGeom>
-        </p:spPr>
-        <p:txBody>
-          <a:bodyPr spcFirstLastPara="1" wrap="square" lIns="91425" tIns="91425" rIns="91425" bIns="91425" anchor="t" anchorCtr="0">
-            <a:normAutofit fontScale="90000"/>
-          </a:bodyPr>
-          <a:lstStyle/>
-          <a:p>
-            <a:pPr marL="0" lvl="0" indent="0" algn="l" rtl="0">
-              <a:spcBef>
-                <a:spcPts val="0"/>
-              </a:spcBef>
-              <a:spcAft>
-                <a:spcPts val="0"/>
-              </a:spcAft>
-              <a:buNone/>
-            </a:pPr>
-            <a:r>
-              <a:rPr lang="hu"/>
-              <a:t>Számok összeadása egy tartományban</a:t>
-            </a:r>
-            <a:endParaRPr/>
-          </a:p>
-        </p:txBody>
-      </p:sp>
-      <p:pic>
-        <p:nvPicPr>
-          <p:cNvPr id="175" name="Google Shape;175;p30"/>
-          <p:cNvPicPr preferRelativeResize="0"/>
-          <p:nvPr/>
-        </p:nvPicPr>
-        <p:blipFill>
-          <a:blip r:embed="rId3">
-            <a:alphaModFix/>
-          </a:blip>
-          <a:stretch>
-            <a:fillRect/>
-          </a:stretch>
-        </p:blipFill>
-        <p:spPr>
-          <a:xfrm>
-            <a:off x="3446100" y="1330350"/>
-            <a:ext cx="4800600" cy="3076575"/>
-          </a:xfrm>
-          <a:prstGeom prst="rect">
-            <a:avLst/>
-          </a:prstGeom>
-          <a:noFill/>
-          <a:ln>
-            <a:noFill/>
-          </a:ln>
-        </p:spPr>
-      </p:pic>
-      <p:sp>
-        <p:nvSpPr>
-          <p:cNvPr id="176" name="Google Shape;176;p30"/>
-          <p:cNvSpPr txBox="1"/>
-          <p:nvPr/>
-        </p:nvSpPr>
-        <p:spPr>
-          <a:xfrm>
-            <a:off x="401475" y="1265950"/>
-            <a:ext cx="3044700" cy="1914000"/>
-          </a:xfrm>
-          <a:prstGeom prst="rect">
-            <a:avLst/>
-          </a:prstGeom>
-          <a:noFill/>
-          <a:ln>
-            <a:noFill/>
-          </a:ln>
-        </p:spPr>
-        <p:txBody>
-          <a:bodyPr spcFirstLastPara="1" wrap="square" lIns="91425" tIns="91425" rIns="91425" bIns="91425" anchor="t" anchorCtr="0">
-            <a:noAutofit/>
-          </a:bodyPr>
-          <a:lstStyle/>
-          <a:p>
-            <a:pPr marL="0" lvl="0" indent="0" algn="l" rtl="0">
-              <a:spcBef>
-                <a:spcPts val="0"/>
-              </a:spcBef>
-              <a:spcAft>
-                <a:spcPts val="0"/>
-              </a:spcAft>
-              <a:buNone/>
-            </a:pPr>
-            <a:r>
-              <a:rPr lang="hu" sz="1600">
-                <a:solidFill>
-                  <a:srgbClr val="404040"/>
-                </a:solidFill>
-                <a:latin typeface="Roboto"/>
-                <a:ea typeface="Roboto"/>
-                <a:cs typeface="Roboto"/>
-                <a:sym typeface="Roboto"/>
-              </a:rPr>
-              <a:t>Ez a program összeadja a számokat egy adott tartományban.</a:t>
-            </a:r>
-            <a:endParaRPr sz="2200">
-              <a:solidFill>
-                <a:schemeClr val="dk2"/>
-              </a:solidFill>
-            </a:endParaRPr>
-          </a:p>
-        </p:txBody>
-      </p:sp>
-    </p:spTree>
-  </p:cSld>
-  <p:clrMapOvr>
-    <a:masterClrMapping/>
-  </p:clrMapOvr>
-</p:sld>
-</file>
-
-<file path=ppt/slides/slide28.xml><?xml version="1.0" encoding="utf-8"?>
-<p:sld xmlns:a="http://schemas.openxmlformats.org/drawingml/2006/main" xmlns:r="http://schemas.openxmlformats.org/officeDocument/2006/relationships" xmlns:p="http://schemas.openxmlformats.org/presentationml/2006/main">
-  <p:cSld>
-    <p:spTree>
-      <p:nvGrpSpPr>
-        <p:cNvPr id="1" name="Shape 180"/>
-        <p:cNvGrpSpPr/>
-        <p:nvPr/>
-      </p:nvGrpSpPr>
-      <p:grpSpPr>
-        <a:xfrm>
-          <a:off x="0" y="0"/>
-          <a:ext cx="0" cy="0"/>
-          <a:chOff x="0" y="0"/>
-          <a:chExt cx="0" cy="0"/>
-        </a:xfrm>
-      </p:grpSpPr>
-      <p:sp>
-        <p:nvSpPr>
-          <p:cNvPr id="181" name="Google Shape;181;p31"/>
-          <p:cNvSpPr txBox="1">
-            <a:spLocks noGrp="1"/>
-          </p:cNvSpPr>
-          <p:nvPr>
-            <p:ph type="title"/>
-          </p:nvPr>
-        </p:nvSpPr>
-        <p:spPr>
-          <a:xfrm>
-            <a:off x="311700" y="391350"/>
-            <a:ext cx="8520600" cy="626100"/>
-          </a:xfrm>
-          <a:prstGeom prst="rect">
-            <a:avLst/>
-          </a:prstGeom>
-        </p:spPr>
-        <p:txBody>
-          <a:bodyPr spcFirstLastPara="1" wrap="square" lIns="91425" tIns="91425" rIns="91425" bIns="91425" anchor="t" anchorCtr="0">
-            <a:normAutofit fontScale="90000"/>
-          </a:bodyPr>
-          <a:lstStyle/>
-          <a:p>
-            <a:pPr marL="0" lvl="0" indent="0" algn="l" rtl="0">
-              <a:spcBef>
-                <a:spcPts val="0"/>
-              </a:spcBef>
-              <a:spcAft>
-                <a:spcPts val="0"/>
-              </a:spcAft>
-              <a:buNone/>
-            </a:pPr>
-            <a:r>
-              <a:rPr lang="hu"/>
-              <a:t>Madárnyelv fordító</a:t>
-            </a:r>
-            <a:endParaRPr/>
-          </a:p>
-        </p:txBody>
-      </p:sp>
-      <p:pic>
-        <p:nvPicPr>
-          <p:cNvPr id="182" name="Google Shape;182;p31"/>
-          <p:cNvPicPr preferRelativeResize="0"/>
-          <p:nvPr/>
-        </p:nvPicPr>
-        <p:blipFill>
-          <a:blip r:embed="rId3">
-            <a:alphaModFix/>
-          </a:blip>
-          <a:stretch>
-            <a:fillRect/>
-          </a:stretch>
-        </p:blipFill>
-        <p:spPr>
-          <a:xfrm>
-            <a:off x="3989100" y="1090000"/>
-            <a:ext cx="3911951" cy="3820975"/>
-          </a:xfrm>
-          <a:prstGeom prst="rect">
-            <a:avLst/>
-          </a:prstGeom>
-          <a:noFill/>
-          <a:ln>
-            <a:noFill/>
-          </a:ln>
-        </p:spPr>
-      </p:pic>
-      <p:sp>
-        <p:nvSpPr>
-          <p:cNvPr id="183" name="Google Shape;183;p31"/>
-          <p:cNvSpPr txBox="1"/>
-          <p:nvPr/>
-        </p:nvSpPr>
-        <p:spPr>
-          <a:xfrm>
-            <a:off x="401475" y="1265950"/>
-            <a:ext cx="3632100" cy="1914000"/>
-          </a:xfrm>
-          <a:prstGeom prst="rect">
-            <a:avLst/>
-          </a:prstGeom>
-          <a:noFill/>
-          <a:ln>
-            <a:noFill/>
-          </a:ln>
-        </p:spPr>
-        <p:txBody>
-          <a:bodyPr spcFirstLastPara="1" wrap="square" lIns="91425" tIns="91425" rIns="91425" bIns="91425" anchor="t" anchorCtr="0">
-            <a:noAutofit/>
-          </a:bodyPr>
-          <a:lstStyle/>
-          <a:p>
-            <a:pPr marL="0" lvl="0" indent="0" algn="l" rtl="0">
-              <a:spcBef>
-                <a:spcPts val="0"/>
-              </a:spcBef>
-              <a:spcAft>
-                <a:spcPts val="0"/>
-              </a:spcAft>
-              <a:buNone/>
-            </a:pPr>
-            <a:r>
-              <a:rPr lang="hu" sz="1600">
-                <a:solidFill>
-                  <a:srgbClr val="404040"/>
-                </a:solidFill>
-                <a:latin typeface="Roboto"/>
-                <a:ea typeface="Roboto"/>
-                <a:cs typeface="Roboto"/>
-                <a:sym typeface="Roboto"/>
-              </a:rPr>
-              <a:t>Ez a program a szöveget "</a:t>
-            </a:r>
-            <a:r>
-              <a:rPr lang="hu" sz="1600" b="1" i="1">
-                <a:solidFill>
-                  <a:srgbClr val="404040"/>
-                </a:solidFill>
-                <a:latin typeface="Roboto"/>
-                <a:ea typeface="Roboto"/>
-                <a:cs typeface="Roboto"/>
-                <a:sym typeface="Roboto"/>
-              </a:rPr>
-              <a:t>madár nyelvre</a:t>
-            </a:r>
-            <a:r>
-              <a:rPr lang="hu" sz="1600">
-                <a:solidFill>
-                  <a:srgbClr val="404040"/>
-                </a:solidFill>
-                <a:latin typeface="Roboto"/>
-                <a:ea typeface="Roboto"/>
-                <a:cs typeface="Roboto"/>
-                <a:sym typeface="Roboto"/>
-              </a:rPr>
-              <a:t>" fordítja, minden magánhangzó után hozzáad egy "</a:t>
-            </a:r>
-            <a:r>
-              <a:rPr lang="hu" sz="1600" b="1">
-                <a:solidFill>
-                  <a:srgbClr val="404040"/>
-                </a:solidFill>
-                <a:latin typeface="Roboto"/>
-                <a:ea typeface="Roboto"/>
-                <a:cs typeface="Roboto"/>
-                <a:sym typeface="Roboto"/>
-              </a:rPr>
-              <a:t>v</a:t>
-            </a:r>
-            <a:r>
-              <a:rPr lang="hu" sz="1600">
-                <a:solidFill>
-                  <a:srgbClr val="404040"/>
-                </a:solidFill>
-                <a:latin typeface="Roboto"/>
-                <a:ea typeface="Roboto"/>
-                <a:cs typeface="Roboto"/>
-                <a:sym typeface="Roboto"/>
-              </a:rPr>
-              <a:t>" betűt és ismétli a magánhangzót.</a:t>
-            </a:r>
-            <a:endParaRPr sz="2200">
-              <a:solidFill>
-                <a:schemeClr val="dk2"/>
-              </a:solidFill>
-            </a:endParaRPr>
-          </a:p>
-        </p:txBody>
-      </p:sp>
     </p:spTree>
   </p:cSld>
   <p:clrMapOvr>
@@ -12262,6 +12590,501 @@
               <a:t>Autókban, okoseszközökben, gyártási gépekben is futnak programok.</a:t>
             </a:r>
             <a:endParaRPr/>
+          </a:p>
+        </p:txBody>
+      </p:sp>
+    </p:spTree>
+  </p:cSld>
+  <p:clrMapOvr>
+    <a:masterClrMapping/>
+  </p:clrMapOvr>
+</p:sld>
+</file>
+
+<file path=ppt/slides/slide30.xml><?xml version="1.0" encoding="utf-8"?>
+<p:sld xmlns:a="http://schemas.openxmlformats.org/drawingml/2006/main" xmlns:r="http://schemas.openxmlformats.org/officeDocument/2006/relationships" xmlns:p="http://schemas.openxmlformats.org/presentationml/2006/main">
+  <p:cSld>
+    <p:spTree>
+      <p:nvGrpSpPr>
+        <p:cNvPr id="1" name="Shape 166"/>
+        <p:cNvGrpSpPr/>
+        <p:nvPr/>
+      </p:nvGrpSpPr>
+      <p:grpSpPr>
+        <a:xfrm>
+          <a:off x="0" y="0"/>
+          <a:ext cx="0" cy="0"/>
+          <a:chOff x="0" y="0"/>
+          <a:chExt cx="0" cy="0"/>
+        </a:xfrm>
+      </p:grpSpPr>
+      <p:sp>
+        <p:nvSpPr>
+          <p:cNvPr id="167" name="Google Shape;167;p29"/>
+          <p:cNvSpPr txBox="1">
+            <a:spLocks noGrp="1"/>
+          </p:cNvSpPr>
+          <p:nvPr>
+            <p:ph type="title"/>
+          </p:nvPr>
+        </p:nvSpPr>
+        <p:spPr>
+          <a:xfrm>
+            <a:off x="311700" y="391350"/>
+            <a:ext cx="8520600" cy="626100"/>
+          </a:xfrm>
+          <a:prstGeom prst="rect">
+            <a:avLst/>
+          </a:prstGeom>
+        </p:spPr>
+        <p:txBody>
+          <a:bodyPr spcFirstLastPara="1" wrap="square" lIns="91425" tIns="91425" rIns="91425" bIns="91425" anchor="t" anchorCtr="0">
+            <a:normAutofit fontScale="90000"/>
+          </a:bodyPr>
+          <a:lstStyle/>
+          <a:p>
+            <a:pPr marL="0" lvl="0" indent="0" algn="l" rtl="0">
+              <a:spcBef>
+                <a:spcPts val="0"/>
+              </a:spcBef>
+              <a:spcAft>
+                <a:spcPts val="0"/>
+              </a:spcAft>
+              <a:buNone/>
+            </a:pPr>
+            <a:r>
+              <a:rPr lang="hu"/>
+              <a:t>Jelszó generátor</a:t>
+            </a:r>
+            <a:endParaRPr/>
+          </a:p>
+        </p:txBody>
+      </p:sp>
+      <p:pic>
+        <p:nvPicPr>
+          <p:cNvPr id="168" name="Google Shape;168;p29"/>
+          <p:cNvPicPr preferRelativeResize="0"/>
+          <p:nvPr/>
+        </p:nvPicPr>
+        <p:blipFill>
+          <a:blip r:embed="rId3">
+            <a:alphaModFix/>
+          </a:blip>
+          <a:stretch>
+            <a:fillRect/>
+          </a:stretch>
+        </p:blipFill>
+        <p:spPr>
+          <a:xfrm>
+            <a:off x="2867450" y="867475"/>
+            <a:ext cx="5565539" cy="3820975"/>
+          </a:xfrm>
+          <a:prstGeom prst="rect">
+            <a:avLst/>
+          </a:prstGeom>
+          <a:noFill/>
+          <a:ln>
+            <a:noFill/>
+          </a:ln>
+        </p:spPr>
+      </p:pic>
+      <p:sp>
+        <p:nvSpPr>
+          <p:cNvPr id="169" name="Google Shape;169;p29"/>
+          <p:cNvSpPr txBox="1"/>
+          <p:nvPr/>
+        </p:nvSpPr>
+        <p:spPr>
+          <a:xfrm>
+            <a:off x="401475" y="1265950"/>
+            <a:ext cx="2350200" cy="2697300"/>
+          </a:xfrm>
+          <a:prstGeom prst="rect">
+            <a:avLst/>
+          </a:prstGeom>
+          <a:noFill/>
+          <a:ln>
+            <a:noFill/>
+          </a:ln>
+        </p:spPr>
+        <p:txBody>
+          <a:bodyPr spcFirstLastPara="1" wrap="square" lIns="91425" tIns="91425" rIns="91425" bIns="91425" anchor="t" anchorCtr="0">
+            <a:noAutofit/>
+          </a:bodyPr>
+          <a:lstStyle/>
+          <a:p>
+            <a:pPr marL="0" lvl="0" indent="0" algn="l" rtl="0">
+              <a:spcBef>
+                <a:spcPts val="0"/>
+              </a:spcBef>
+              <a:spcAft>
+                <a:spcPts val="0"/>
+              </a:spcAft>
+              <a:buNone/>
+            </a:pPr>
+            <a:r>
+              <a:rPr lang="hu" sz="1600">
+                <a:solidFill>
+                  <a:srgbClr val="404040"/>
+                </a:solidFill>
+                <a:latin typeface="Roboto"/>
+                <a:ea typeface="Roboto"/>
+                <a:cs typeface="Roboto"/>
+                <a:sym typeface="Roboto"/>
+              </a:rPr>
+              <a:t>Egy egyszerű jelszó generátor, amely véletlenszerű jelszót hoz létre.</a:t>
+            </a:r>
+            <a:endParaRPr sz="2600">
+              <a:solidFill>
+                <a:schemeClr val="dk2"/>
+              </a:solidFill>
+            </a:endParaRPr>
+          </a:p>
+        </p:txBody>
+      </p:sp>
+    </p:spTree>
+  </p:cSld>
+  <p:clrMapOvr>
+    <a:masterClrMapping/>
+  </p:clrMapOvr>
+</p:sld>
+</file>
+
+<file path=ppt/slides/slide31.xml><?xml version="1.0" encoding="utf-8"?>
+<p:sld xmlns:a="http://schemas.openxmlformats.org/drawingml/2006/main" xmlns:r="http://schemas.openxmlformats.org/officeDocument/2006/relationships" xmlns:p="http://schemas.openxmlformats.org/presentationml/2006/main">
+  <p:cSld>
+    <p:spTree>
+      <p:nvGrpSpPr>
+        <p:cNvPr id="1" name="Shape 173"/>
+        <p:cNvGrpSpPr/>
+        <p:nvPr/>
+      </p:nvGrpSpPr>
+      <p:grpSpPr>
+        <a:xfrm>
+          <a:off x="0" y="0"/>
+          <a:ext cx="0" cy="0"/>
+          <a:chOff x="0" y="0"/>
+          <a:chExt cx="0" cy="0"/>
+        </a:xfrm>
+      </p:grpSpPr>
+      <p:sp>
+        <p:nvSpPr>
+          <p:cNvPr id="174" name="Google Shape;174;p30"/>
+          <p:cNvSpPr txBox="1">
+            <a:spLocks noGrp="1"/>
+          </p:cNvSpPr>
+          <p:nvPr>
+            <p:ph type="title"/>
+          </p:nvPr>
+        </p:nvSpPr>
+        <p:spPr>
+          <a:xfrm>
+            <a:off x="311700" y="391350"/>
+            <a:ext cx="8520600" cy="626100"/>
+          </a:xfrm>
+          <a:prstGeom prst="rect">
+            <a:avLst/>
+          </a:prstGeom>
+        </p:spPr>
+        <p:txBody>
+          <a:bodyPr spcFirstLastPara="1" wrap="square" lIns="91425" tIns="91425" rIns="91425" bIns="91425" anchor="t" anchorCtr="0">
+            <a:normAutofit fontScale="90000"/>
+          </a:bodyPr>
+          <a:lstStyle/>
+          <a:p>
+            <a:pPr marL="0" lvl="0" indent="0" algn="l" rtl="0">
+              <a:spcBef>
+                <a:spcPts val="0"/>
+              </a:spcBef>
+              <a:spcAft>
+                <a:spcPts val="0"/>
+              </a:spcAft>
+              <a:buNone/>
+            </a:pPr>
+            <a:r>
+              <a:rPr lang="hu"/>
+              <a:t>Számok összeadása egy tartományban</a:t>
+            </a:r>
+            <a:endParaRPr/>
+          </a:p>
+        </p:txBody>
+      </p:sp>
+      <p:pic>
+        <p:nvPicPr>
+          <p:cNvPr id="175" name="Google Shape;175;p30"/>
+          <p:cNvPicPr preferRelativeResize="0"/>
+          <p:nvPr/>
+        </p:nvPicPr>
+        <p:blipFill>
+          <a:blip r:embed="rId3">
+            <a:alphaModFix/>
+          </a:blip>
+          <a:stretch>
+            <a:fillRect/>
+          </a:stretch>
+        </p:blipFill>
+        <p:spPr>
+          <a:xfrm>
+            <a:off x="3446100" y="1330350"/>
+            <a:ext cx="4800600" cy="3076575"/>
+          </a:xfrm>
+          <a:prstGeom prst="rect">
+            <a:avLst/>
+          </a:prstGeom>
+          <a:noFill/>
+          <a:ln>
+            <a:noFill/>
+          </a:ln>
+        </p:spPr>
+      </p:pic>
+      <p:sp>
+        <p:nvSpPr>
+          <p:cNvPr id="176" name="Google Shape;176;p30"/>
+          <p:cNvSpPr txBox="1"/>
+          <p:nvPr/>
+        </p:nvSpPr>
+        <p:spPr>
+          <a:xfrm>
+            <a:off x="401475" y="1265950"/>
+            <a:ext cx="3044700" cy="1914000"/>
+          </a:xfrm>
+          <a:prstGeom prst="rect">
+            <a:avLst/>
+          </a:prstGeom>
+          <a:noFill/>
+          <a:ln>
+            <a:noFill/>
+          </a:ln>
+        </p:spPr>
+        <p:txBody>
+          <a:bodyPr spcFirstLastPara="1" wrap="square" lIns="91425" tIns="91425" rIns="91425" bIns="91425" anchor="t" anchorCtr="0">
+            <a:noAutofit/>
+          </a:bodyPr>
+          <a:lstStyle/>
+          <a:p>
+            <a:pPr marL="0" lvl="0" indent="0" algn="l" rtl="0">
+              <a:spcBef>
+                <a:spcPts val="0"/>
+              </a:spcBef>
+              <a:spcAft>
+                <a:spcPts val="0"/>
+              </a:spcAft>
+              <a:buNone/>
+            </a:pPr>
+            <a:r>
+              <a:rPr lang="hu" sz="1600">
+                <a:solidFill>
+                  <a:srgbClr val="404040"/>
+                </a:solidFill>
+                <a:latin typeface="Roboto"/>
+                <a:ea typeface="Roboto"/>
+                <a:cs typeface="Roboto"/>
+                <a:sym typeface="Roboto"/>
+              </a:rPr>
+              <a:t>Ez a program összeadja a számokat egy adott tartományban.</a:t>
+            </a:r>
+            <a:endParaRPr sz="2200">
+              <a:solidFill>
+                <a:schemeClr val="dk2"/>
+              </a:solidFill>
+            </a:endParaRPr>
+          </a:p>
+        </p:txBody>
+      </p:sp>
+    </p:spTree>
+  </p:cSld>
+  <p:clrMapOvr>
+    <a:masterClrMapping/>
+  </p:clrMapOvr>
+</p:sld>
+</file>
+
+<file path=ppt/slides/slide32.xml><?xml version="1.0" encoding="utf-8"?>
+<p:sld xmlns:a="http://schemas.openxmlformats.org/drawingml/2006/main" xmlns:r="http://schemas.openxmlformats.org/officeDocument/2006/relationships" xmlns:p="http://schemas.openxmlformats.org/presentationml/2006/main">
+  <p:cSld>
+    <p:spTree>
+      <p:nvGrpSpPr>
+        <p:cNvPr id="1" name="Shape 180"/>
+        <p:cNvGrpSpPr/>
+        <p:nvPr/>
+      </p:nvGrpSpPr>
+      <p:grpSpPr>
+        <a:xfrm>
+          <a:off x="0" y="0"/>
+          <a:ext cx="0" cy="0"/>
+          <a:chOff x="0" y="0"/>
+          <a:chExt cx="0" cy="0"/>
+        </a:xfrm>
+      </p:grpSpPr>
+      <p:sp>
+        <p:nvSpPr>
+          <p:cNvPr id="181" name="Google Shape;181;p31"/>
+          <p:cNvSpPr txBox="1">
+            <a:spLocks noGrp="1"/>
+          </p:cNvSpPr>
+          <p:nvPr>
+            <p:ph type="title"/>
+          </p:nvPr>
+        </p:nvSpPr>
+        <p:spPr>
+          <a:xfrm>
+            <a:off x="311700" y="391350"/>
+            <a:ext cx="8520600" cy="626100"/>
+          </a:xfrm>
+          <a:prstGeom prst="rect">
+            <a:avLst/>
+          </a:prstGeom>
+        </p:spPr>
+        <p:txBody>
+          <a:bodyPr spcFirstLastPara="1" wrap="square" lIns="91425" tIns="91425" rIns="91425" bIns="91425" anchor="t" anchorCtr="0">
+            <a:normAutofit fontScale="90000"/>
+          </a:bodyPr>
+          <a:lstStyle/>
+          <a:p>
+            <a:pPr marL="0" lvl="0" indent="0" algn="l" rtl="0">
+              <a:spcBef>
+                <a:spcPts val="0"/>
+              </a:spcBef>
+              <a:spcAft>
+                <a:spcPts val="0"/>
+              </a:spcAft>
+              <a:buNone/>
+            </a:pPr>
+            <a:r>
+              <a:rPr lang="hu"/>
+              <a:t>Madárnyelv fordító</a:t>
+            </a:r>
+            <a:endParaRPr/>
+          </a:p>
+        </p:txBody>
+      </p:sp>
+      <p:pic>
+        <p:nvPicPr>
+          <p:cNvPr id="182" name="Google Shape;182;p31"/>
+          <p:cNvPicPr preferRelativeResize="0"/>
+          <p:nvPr/>
+        </p:nvPicPr>
+        <p:blipFill>
+          <a:blip r:embed="rId3">
+            <a:alphaModFix/>
+          </a:blip>
+          <a:stretch>
+            <a:fillRect/>
+          </a:stretch>
+        </p:blipFill>
+        <p:spPr>
+          <a:xfrm>
+            <a:off x="3989100" y="1090000"/>
+            <a:ext cx="3911951" cy="3820975"/>
+          </a:xfrm>
+          <a:prstGeom prst="rect">
+            <a:avLst/>
+          </a:prstGeom>
+          <a:noFill/>
+          <a:ln>
+            <a:noFill/>
+          </a:ln>
+        </p:spPr>
+      </p:pic>
+      <p:sp>
+        <p:nvSpPr>
+          <p:cNvPr id="183" name="Google Shape;183;p31"/>
+          <p:cNvSpPr txBox="1"/>
+          <p:nvPr/>
+        </p:nvSpPr>
+        <p:spPr>
+          <a:xfrm>
+            <a:off x="401475" y="1265950"/>
+            <a:ext cx="3632100" cy="1914000"/>
+          </a:xfrm>
+          <a:prstGeom prst="rect">
+            <a:avLst/>
+          </a:prstGeom>
+          <a:noFill/>
+          <a:ln>
+            <a:noFill/>
+          </a:ln>
+        </p:spPr>
+        <p:txBody>
+          <a:bodyPr spcFirstLastPara="1" wrap="square" lIns="91425" tIns="91425" rIns="91425" bIns="91425" anchor="t" anchorCtr="0">
+            <a:noAutofit/>
+          </a:bodyPr>
+          <a:lstStyle/>
+          <a:p>
+            <a:pPr marL="0" lvl="0" indent="0" algn="l" rtl="0">
+              <a:spcBef>
+                <a:spcPts val="0"/>
+              </a:spcBef>
+              <a:spcAft>
+                <a:spcPts val="0"/>
+              </a:spcAft>
+              <a:buNone/>
+            </a:pPr>
+            <a:r>
+              <a:rPr lang="hu" sz="1600">
+                <a:solidFill>
+                  <a:srgbClr val="404040"/>
+                </a:solidFill>
+                <a:latin typeface="Roboto"/>
+                <a:ea typeface="Roboto"/>
+                <a:cs typeface="Roboto"/>
+                <a:sym typeface="Roboto"/>
+              </a:rPr>
+              <a:t>Ez a program a szöveget "</a:t>
+            </a:r>
+            <a:r>
+              <a:rPr lang="hu" sz="1600" b="1" i="1">
+                <a:solidFill>
+                  <a:srgbClr val="404040"/>
+                </a:solidFill>
+                <a:latin typeface="Roboto"/>
+                <a:ea typeface="Roboto"/>
+                <a:cs typeface="Roboto"/>
+                <a:sym typeface="Roboto"/>
+              </a:rPr>
+              <a:t>madár nyelvre</a:t>
+            </a:r>
+            <a:r>
+              <a:rPr lang="hu" sz="1600">
+                <a:solidFill>
+                  <a:srgbClr val="404040"/>
+                </a:solidFill>
+                <a:latin typeface="Roboto"/>
+                <a:ea typeface="Roboto"/>
+                <a:cs typeface="Roboto"/>
+                <a:sym typeface="Roboto"/>
+              </a:rPr>
+              <a:t>" fordítja, minden magánhangzó után hozzáad egy "</a:t>
+            </a:r>
+            <a:r>
+              <a:rPr lang="hu" sz="1600" b="1">
+                <a:solidFill>
+                  <a:srgbClr val="404040"/>
+                </a:solidFill>
+                <a:latin typeface="Roboto"/>
+                <a:ea typeface="Roboto"/>
+                <a:cs typeface="Roboto"/>
+                <a:sym typeface="Roboto"/>
+              </a:rPr>
+              <a:t>v</a:t>
+            </a:r>
+            <a:r>
+              <a:rPr lang="hu" sz="1600">
+                <a:solidFill>
+                  <a:srgbClr val="404040"/>
+                </a:solidFill>
+                <a:latin typeface="Roboto"/>
+                <a:ea typeface="Roboto"/>
+                <a:cs typeface="Roboto"/>
+                <a:sym typeface="Roboto"/>
+              </a:rPr>
+              <a:t>" betűt és ismétli a magánhangzót.</a:t>
+            </a:r>
+            <a:endParaRPr sz="2200">
+              <a:solidFill>
+                <a:schemeClr val="dk2"/>
+              </a:solidFill>
+            </a:endParaRPr>
           </a:p>
         </p:txBody>
       </p:sp>

</xml_diff>

<commit_message>
Scratch triangle function and turtle added
</commit_message>
<xml_diff>
--- a/prog/Bevezetés a Programozás Világába.pptx
+++ b/prog/Bevezetés a Programozás Világába.pptx
@@ -5,7 +5,7 @@
     <p:sldMasterId id="2147483659" r:id="rId1"/>
   </p:sldMasterIdLst>
   <p:notesMasterIdLst>
-    <p:notesMasterId r:id="rId53"/>
+    <p:notesMasterId r:id="rId55"/>
   </p:notesMasterIdLst>
   <p:sldIdLst>
     <p:sldId id="256" r:id="rId2"/>
@@ -39,50 +39,52 @@
     <p:sldId id="292" r:id="rId30"/>
     <p:sldId id="293" r:id="rId31"/>
     <p:sldId id="294" r:id="rId32"/>
-    <p:sldId id="295" r:id="rId33"/>
-    <p:sldId id="296" r:id="rId34"/>
-    <p:sldId id="297" r:id="rId35"/>
-    <p:sldId id="303" r:id="rId36"/>
-    <p:sldId id="302" r:id="rId37"/>
-    <p:sldId id="298" r:id="rId38"/>
-    <p:sldId id="299" r:id="rId39"/>
-    <p:sldId id="301" r:id="rId40"/>
-    <p:sldId id="267" r:id="rId41"/>
-    <p:sldId id="268" r:id="rId42"/>
-    <p:sldId id="269" r:id="rId43"/>
-    <p:sldId id="270" r:id="rId44"/>
-    <p:sldId id="271" r:id="rId45"/>
-    <p:sldId id="304" r:id="rId46"/>
-    <p:sldId id="305" r:id="rId47"/>
-    <p:sldId id="306" r:id="rId48"/>
-    <p:sldId id="307" r:id="rId49"/>
-    <p:sldId id="272" r:id="rId50"/>
-    <p:sldId id="273" r:id="rId51"/>
-    <p:sldId id="274" r:id="rId52"/>
+    <p:sldId id="308" r:id="rId33"/>
+    <p:sldId id="309" r:id="rId34"/>
+    <p:sldId id="295" r:id="rId35"/>
+    <p:sldId id="296" r:id="rId36"/>
+    <p:sldId id="297" r:id="rId37"/>
+    <p:sldId id="303" r:id="rId38"/>
+    <p:sldId id="302" r:id="rId39"/>
+    <p:sldId id="298" r:id="rId40"/>
+    <p:sldId id="299" r:id="rId41"/>
+    <p:sldId id="301" r:id="rId42"/>
+    <p:sldId id="267" r:id="rId43"/>
+    <p:sldId id="268" r:id="rId44"/>
+    <p:sldId id="269" r:id="rId45"/>
+    <p:sldId id="270" r:id="rId46"/>
+    <p:sldId id="271" r:id="rId47"/>
+    <p:sldId id="304" r:id="rId48"/>
+    <p:sldId id="305" r:id="rId49"/>
+    <p:sldId id="306" r:id="rId50"/>
+    <p:sldId id="307" r:id="rId51"/>
+    <p:sldId id="272" r:id="rId52"/>
+    <p:sldId id="273" r:id="rId53"/>
+    <p:sldId id="274" r:id="rId54"/>
   </p:sldIdLst>
   <p:sldSz cx="9144000" cy="5143500" type="screen16x9"/>
   <p:notesSz cx="6858000" cy="9144000"/>
   <p:embeddedFontLst>
     <p:embeddedFont>
       <p:font typeface="Lato" panose="020F0502020204030203" pitchFamily="34" charset="0"/>
-      <p:regular r:id="rId54"/>
-      <p:bold r:id="rId55"/>
-      <p:italic r:id="rId56"/>
-      <p:boldItalic r:id="rId57"/>
+      <p:regular r:id="rId56"/>
+      <p:bold r:id="rId57"/>
+      <p:italic r:id="rId58"/>
+      <p:boldItalic r:id="rId59"/>
     </p:embeddedFont>
     <p:embeddedFont>
       <p:font typeface="Playfair Display" panose="00000500000000000000" pitchFamily="2" charset="0"/>
-      <p:regular r:id="rId58"/>
-      <p:bold r:id="rId59"/>
-      <p:italic r:id="rId60"/>
-      <p:boldItalic r:id="rId61"/>
+      <p:regular r:id="rId60"/>
+      <p:bold r:id="rId61"/>
+      <p:italic r:id="rId62"/>
+      <p:boldItalic r:id="rId63"/>
     </p:embeddedFont>
     <p:embeddedFont>
       <p:font typeface="Roboto" panose="02000000000000000000" pitchFamily="2" charset="0"/>
-      <p:regular r:id="rId62"/>
-      <p:bold r:id="rId63"/>
-      <p:italic r:id="rId64"/>
-      <p:boldItalic r:id="rId65"/>
+      <p:regular r:id="rId64"/>
+      <p:bold r:id="rId65"/>
+      <p:italic r:id="rId66"/>
+      <p:boldItalic r:id="rId67"/>
     </p:embeddedFont>
   </p:embeddedFontLst>
   <p:defaultTextStyle>
@@ -9094,9 +9096,17 @@
           <a:p>
             <a:r>
               <a:rPr lang="hu-HU" dirty="0"/>
-              <a:t>Python</a:t>
-            </a:r>
-            <a:endParaRPr lang="en-US" dirty="0"/>
+              <a:t>Python </a:t>
+            </a:r>
+            <a:r>
+              <a:rPr lang="hu-HU" sz="2400" dirty="0"/>
+              <a:t>és egy kicsi </a:t>
+            </a:r>
+            <a:r>
+              <a:rPr lang="hu-HU" sz="2400" dirty="0" err="1"/>
+              <a:t>Scratch</a:t>
+            </a:r>
+            <a:endParaRPr lang="en-US" sz="2400" dirty="0"/>
           </a:p>
         </p:txBody>
       </p:sp>
@@ -13378,6 +13388,252 @@
           <p:cNvPr id="2" name="Cím 1">
             <a:extLst>
               <a:ext uri="{FF2B5EF4-FFF2-40B4-BE49-F238E27FC236}">
+                <a16:creationId xmlns:a16="http://schemas.microsoft.com/office/drawing/2014/main" id="{1C179256-8A19-47DE-89EC-A526F9A399E6}"/>
+              </a:ext>
+            </a:extLst>
+          </p:cNvPr>
+          <p:cNvSpPr>
+            <a:spLocks noGrp="1"/>
+          </p:cNvSpPr>
+          <p:nvPr>
+            <p:ph type="title"/>
+          </p:nvPr>
+        </p:nvSpPr>
+        <p:spPr/>
+        <p:txBody>
+          <a:bodyPr>
+            <a:normAutofit fontScale="90000"/>
+          </a:bodyPr>
+          <a:lstStyle/>
+          <a:p>
+            <a:r>
+              <a:rPr lang="hu-HU" dirty="0"/>
+              <a:t>Függvény </a:t>
+            </a:r>
+            <a:r>
+              <a:rPr lang="hu-HU" dirty="0" err="1"/>
+              <a:t>Scratchben</a:t>
+            </a:r>
+            <a:endParaRPr lang="en-US" dirty="0"/>
+          </a:p>
+        </p:txBody>
+      </p:sp>
+      <p:pic>
+        <p:nvPicPr>
+          <p:cNvPr id="5" name="Kép 4">
+            <a:extLst>
+              <a:ext uri="{FF2B5EF4-FFF2-40B4-BE49-F238E27FC236}">
+                <a16:creationId xmlns:a16="http://schemas.microsoft.com/office/drawing/2014/main" id="{4B895AF8-63C8-72EF-3946-8FF6235245E5}"/>
+              </a:ext>
+            </a:extLst>
+          </p:cNvPr>
+          <p:cNvPicPr>
+            <a:picLocks noChangeAspect="1"/>
+          </p:cNvPicPr>
+          <p:nvPr/>
+        </p:nvPicPr>
+        <p:blipFill>
+          <a:blip r:embed="rId2"/>
+          <a:stretch>
+            <a:fillRect/>
+          </a:stretch>
+        </p:blipFill>
+        <p:spPr>
+          <a:xfrm>
+            <a:off x="678873" y="1017450"/>
+            <a:ext cx="4544642" cy="3494554"/>
+          </a:xfrm>
+          <a:prstGeom prst="rect">
+            <a:avLst/>
+          </a:prstGeom>
+        </p:spPr>
+      </p:pic>
+      <p:pic>
+        <p:nvPicPr>
+          <p:cNvPr id="7" name="Kép 6">
+            <a:extLst>
+              <a:ext uri="{FF2B5EF4-FFF2-40B4-BE49-F238E27FC236}">
+                <a16:creationId xmlns:a16="http://schemas.microsoft.com/office/drawing/2014/main" id="{913EB6E3-CBE2-F5FD-07C1-E26551D44ED7}"/>
+              </a:ext>
+            </a:extLst>
+          </p:cNvPr>
+          <p:cNvPicPr>
+            <a:picLocks noChangeAspect="1"/>
+          </p:cNvPicPr>
+          <p:nvPr/>
+        </p:nvPicPr>
+        <p:blipFill>
+          <a:blip r:embed="rId3"/>
+          <a:stretch>
+            <a:fillRect/>
+          </a:stretch>
+        </p:blipFill>
+        <p:spPr>
+          <a:xfrm>
+            <a:off x="5645621" y="1161853"/>
+            <a:ext cx="2113968" cy="1955420"/>
+          </a:xfrm>
+          <a:prstGeom prst="rect">
+            <a:avLst/>
+          </a:prstGeom>
+        </p:spPr>
+      </p:pic>
+    </p:spTree>
+    <p:extLst>
+      <p:ext uri="{BB962C8B-B14F-4D97-AF65-F5344CB8AC3E}">
+        <p14:creationId xmlns:p14="http://schemas.microsoft.com/office/powerpoint/2010/main" val="241958192"/>
+      </p:ext>
+    </p:extLst>
+  </p:cSld>
+  <p:clrMapOvr>
+    <a:masterClrMapping/>
+  </p:clrMapOvr>
+</p:sld>
+</file>
+
+<file path=ppt/slides/slide33.xml><?xml version="1.0" encoding="utf-8"?>
+<p:sld xmlns:a="http://schemas.openxmlformats.org/drawingml/2006/main" xmlns:r="http://schemas.openxmlformats.org/officeDocument/2006/relationships" xmlns:p="http://schemas.openxmlformats.org/presentationml/2006/main">
+  <p:cSld>
+    <p:spTree>
+      <p:nvGrpSpPr>
+        <p:cNvPr id="1" name=""/>
+        <p:cNvGrpSpPr/>
+        <p:nvPr/>
+      </p:nvGrpSpPr>
+      <p:grpSpPr>
+        <a:xfrm>
+          <a:off x="0" y="0"/>
+          <a:ext cx="0" cy="0"/>
+          <a:chOff x="0" y="0"/>
+          <a:chExt cx="0" cy="0"/>
+        </a:xfrm>
+      </p:grpSpPr>
+      <p:sp>
+        <p:nvSpPr>
+          <p:cNvPr id="2" name="Cím 1">
+            <a:extLst>
+              <a:ext uri="{FF2B5EF4-FFF2-40B4-BE49-F238E27FC236}">
+                <a16:creationId xmlns:a16="http://schemas.microsoft.com/office/drawing/2014/main" id="{453B2846-C69F-8348-601B-9AF36C23E400}"/>
+              </a:ext>
+            </a:extLst>
+          </p:cNvPr>
+          <p:cNvSpPr>
+            <a:spLocks noGrp="1"/>
+          </p:cNvSpPr>
+          <p:nvPr>
+            <p:ph type="title"/>
+          </p:nvPr>
+        </p:nvSpPr>
+        <p:spPr/>
+        <p:txBody>
+          <a:bodyPr>
+            <a:normAutofit fontScale="90000"/>
+          </a:bodyPr>
+          <a:lstStyle/>
+          <a:p>
+            <a:r>
+              <a:rPr lang="hu-HU" dirty="0"/>
+              <a:t>Több háromszög</a:t>
+            </a:r>
+            <a:endParaRPr lang="en-US" dirty="0"/>
+          </a:p>
+        </p:txBody>
+      </p:sp>
+      <p:pic>
+        <p:nvPicPr>
+          <p:cNvPr id="5" name="Kép 4">
+            <a:extLst>
+              <a:ext uri="{FF2B5EF4-FFF2-40B4-BE49-F238E27FC236}">
+                <a16:creationId xmlns:a16="http://schemas.microsoft.com/office/drawing/2014/main" id="{8AF6525B-BAC7-C2D9-D1B1-01D05E706713}"/>
+              </a:ext>
+            </a:extLst>
+          </p:cNvPr>
+          <p:cNvPicPr>
+            <a:picLocks noChangeAspect="1"/>
+          </p:cNvPicPr>
+          <p:nvPr/>
+        </p:nvPicPr>
+        <p:blipFill>
+          <a:blip r:embed="rId2"/>
+          <a:stretch>
+            <a:fillRect/>
+          </a:stretch>
+        </p:blipFill>
+        <p:spPr>
+          <a:xfrm>
+            <a:off x="365703" y="1022461"/>
+            <a:ext cx="4067752" cy="3788530"/>
+          </a:xfrm>
+          <a:prstGeom prst="rect">
+            <a:avLst/>
+          </a:prstGeom>
+        </p:spPr>
+      </p:pic>
+      <p:pic>
+        <p:nvPicPr>
+          <p:cNvPr id="7" name="Kép 6">
+            <a:extLst>
+              <a:ext uri="{FF2B5EF4-FFF2-40B4-BE49-F238E27FC236}">
+                <a16:creationId xmlns:a16="http://schemas.microsoft.com/office/drawing/2014/main" id="{B5A85993-582C-0F87-F429-4821043A0E21}"/>
+              </a:ext>
+            </a:extLst>
+          </p:cNvPr>
+          <p:cNvPicPr>
+            <a:picLocks noChangeAspect="1"/>
+          </p:cNvPicPr>
+          <p:nvPr/>
+        </p:nvPicPr>
+        <p:blipFill>
+          <a:blip r:embed="rId3"/>
+          <a:stretch>
+            <a:fillRect/>
+          </a:stretch>
+        </p:blipFill>
+        <p:spPr>
+          <a:xfrm>
+            <a:off x="4957903" y="1406237"/>
+            <a:ext cx="3300054" cy="2195946"/>
+          </a:xfrm>
+          <a:prstGeom prst="rect">
+            <a:avLst/>
+          </a:prstGeom>
+        </p:spPr>
+      </p:pic>
+    </p:spTree>
+    <p:extLst>
+      <p:ext uri="{BB962C8B-B14F-4D97-AF65-F5344CB8AC3E}">
+        <p14:creationId xmlns:p14="http://schemas.microsoft.com/office/powerpoint/2010/main" val="1191448210"/>
+      </p:ext>
+    </p:extLst>
+  </p:cSld>
+  <p:clrMapOvr>
+    <a:masterClrMapping/>
+  </p:clrMapOvr>
+</p:sld>
+</file>
+
+<file path=ppt/slides/slide34.xml><?xml version="1.0" encoding="utf-8"?>
+<p:sld xmlns:a="http://schemas.openxmlformats.org/drawingml/2006/main" xmlns:r="http://schemas.openxmlformats.org/officeDocument/2006/relationships" xmlns:p="http://schemas.openxmlformats.org/presentationml/2006/main">
+  <p:cSld>
+    <p:spTree>
+      <p:nvGrpSpPr>
+        <p:cNvPr id="1" name=""/>
+        <p:cNvGrpSpPr/>
+        <p:nvPr/>
+      </p:nvGrpSpPr>
+      <p:grpSpPr>
+        <a:xfrm>
+          <a:off x="0" y="0"/>
+          <a:ext cx="0" cy="0"/>
+          <a:chOff x="0" y="0"/>
+          <a:chExt cx="0" cy="0"/>
+        </a:xfrm>
+      </p:grpSpPr>
+      <p:sp>
+        <p:nvSpPr>
+          <p:cNvPr id="2" name="Cím 1">
+            <a:extLst>
+              <a:ext uri="{FF2B5EF4-FFF2-40B4-BE49-F238E27FC236}">
                 <a16:creationId xmlns:a16="http://schemas.microsoft.com/office/drawing/2014/main" id="{D5380545-313C-DEC2-D51A-34C28FCAB2D4}"/>
               </a:ext>
             </a:extLst>
@@ -13508,7 +13764,7 @@
 </p:sld>
 </file>
 
-<file path=ppt/slides/slide33.xml><?xml version="1.0" encoding="utf-8"?>
+<file path=ppt/slides/slide35.xml><?xml version="1.0" encoding="utf-8"?>
 <p:sld xmlns:a="http://schemas.openxmlformats.org/drawingml/2006/main" xmlns:r="http://schemas.openxmlformats.org/officeDocument/2006/relationships" xmlns:p="http://schemas.openxmlformats.org/presentationml/2006/main">
   <p:cSld>
     <p:spTree>
@@ -13797,7 +14053,7 @@
 </p:sld>
 </file>
 
-<file path=ppt/slides/slide34.xml><?xml version="1.0" encoding="utf-8"?>
+<file path=ppt/slides/slide36.xml><?xml version="1.0" encoding="utf-8"?>
 <p:sld xmlns:a="http://schemas.openxmlformats.org/drawingml/2006/main" xmlns:r="http://schemas.openxmlformats.org/officeDocument/2006/relationships" xmlns:p="http://schemas.openxmlformats.org/presentationml/2006/main">
   <p:cSld>
     <p:spTree>
@@ -14188,7 +14444,7 @@
 </p:sld>
 </file>
 
-<file path=ppt/slides/slide35.xml><?xml version="1.0" encoding="utf-8"?>
+<file path=ppt/slides/slide37.xml><?xml version="1.0" encoding="utf-8"?>
 <p:sld xmlns:a="http://schemas.openxmlformats.org/drawingml/2006/main" xmlns:r="http://schemas.openxmlformats.org/officeDocument/2006/relationships" xmlns:p="http://schemas.openxmlformats.org/presentationml/2006/main">
   <p:cSld>
     <p:spTree>
@@ -14398,7 +14654,7 @@
 </p:sld>
 </file>
 
-<file path=ppt/slides/slide36.xml><?xml version="1.0" encoding="utf-8"?>
+<file path=ppt/slides/slide38.xml><?xml version="1.0" encoding="utf-8"?>
 <p:sld xmlns:a="http://schemas.openxmlformats.org/drawingml/2006/main" xmlns:r="http://schemas.openxmlformats.org/officeDocument/2006/relationships" xmlns:p="http://schemas.openxmlformats.org/presentationml/2006/main">
   <p:cSld>
     <p:spTree>
@@ -14658,7 +14914,7 @@
 </p:sld>
 </file>
 
-<file path=ppt/slides/slide37.xml><?xml version="1.0" encoding="utf-8"?>
+<file path=ppt/slides/slide39.xml><?xml version="1.0" encoding="utf-8"?>
 <p:sld xmlns:a="http://schemas.openxmlformats.org/drawingml/2006/main" xmlns:r="http://schemas.openxmlformats.org/officeDocument/2006/relationships" xmlns:p="http://schemas.openxmlformats.org/presentationml/2006/main">
   <p:cSld>
     <p:spTree>
@@ -14749,7 +15005,163 @@
 </p:sld>
 </file>
 
-<file path=ppt/slides/slide38.xml><?xml version="1.0" encoding="utf-8"?>
+<file path=ppt/slides/slide4.xml><?xml version="1.0" encoding="utf-8"?>
+<p:sld xmlns:a="http://schemas.openxmlformats.org/drawingml/2006/main" xmlns:r="http://schemas.openxmlformats.org/officeDocument/2006/relationships" xmlns:p="http://schemas.openxmlformats.org/presentationml/2006/main">
+  <p:cSld>
+    <p:spTree>
+      <p:nvGrpSpPr>
+        <p:cNvPr id="1" name="Shape 77"/>
+        <p:cNvGrpSpPr/>
+        <p:nvPr/>
+      </p:nvGrpSpPr>
+      <p:grpSpPr>
+        <a:xfrm>
+          <a:off x="0" y="0"/>
+          <a:ext cx="0" cy="0"/>
+          <a:chOff x="0" y="0"/>
+          <a:chExt cx="0" cy="0"/>
+        </a:xfrm>
+      </p:grpSpPr>
+      <p:sp>
+        <p:nvSpPr>
+          <p:cNvPr id="78" name="Google Shape;78;p16"/>
+          <p:cNvSpPr txBox="1">
+            <a:spLocks noGrp="1"/>
+          </p:cNvSpPr>
+          <p:nvPr>
+            <p:ph type="title"/>
+          </p:nvPr>
+        </p:nvSpPr>
+        <p:spPr>
+          <a:xfrm>
+            <a:off x="311700" y="391350"/>
+            <a:ext cx="8520600" cy="626100"/>
+          </a:xfrm>
+          <a:prstGeom prst="rect">
+            <a:avLst/>
+          </a:prstGeom>
+        </p:spPr>
+        <p:txBody>
+          <a:bodyPr spcFirstLastPara="1" wrap="square" lIns="91425" tIns="91425" rIns="91425" bIns="91425" anchor="t" anchorCtr="0">
+            <a:normAutofit fontScale="90000"/>
+          </a:bodyPr>
+          <a:lstStyle/>
+          <a:p>
+            <a:pPr marL="0" lvl="0" indent="0" algn="l" rtl="0">
+              <a:spcBef>
+                <a:spcPts val="0"/>
+              </a:spcBef>
+              <a:spcAft>
+                <a:spcPts val="0"/>
+              </a:spcAft>
+              <a:buNone/>
+            </a:pPr>
+            <a:r>
+              <a:rPr lang="hu"/>
+              <a:t>Mi van a program fájlban?</a:t>
+            </a:r>
+            <a:endParaRPr/>
+          </a:p>
+        </p:txBody>
+      </p:sp>
+      <p:sp>
+        <p:nvSpPr>
+          <p:cNvPr id="79" name="Google Shape;79;p16"/>
+          <p:cNvSpPr txBox="1">
+            <a:spLocks noGrp="1"/>
+          </p:cNvSpPr>
+          <p:nvPr>
+            <p:ph type="body" idx="1"/>
+          </p:nvPr>
+        </p:nvSpPr>
+        <p:spPr>
+          <a:xfrm>
+            <a:off x="311700" y="1152475"/>
+            <a:ext cx="8520600" cy="3416400"/>
+          </a:xfrm>
+          <a:prstGeom prst="rect">
+            <a:avLst/>
+          </a:prstGeom>
+        </p:spPr>
+        <p:txBody>
+          <a:bodyPr spcFirstLastPara="1" wrap="square" lIns="91425" tIns="91425" rIns="91425" bIns="91425" anchor="t" anchorCtr="0">
+            <a:normAutofit/>
+          </a:bodyPr>
+          <a:lstStyle/>
+          <a:p>
+            <a:pPr marL="457200" lvl="0" indent="-342900" algn="l" rtl="0">
+              <a:spcBef>
+                <a:spcPts val="0"/>
+              </a:spcBef>
+              <a:spcAft>
+                <a:spcPts val="0"/>
+              </a:spcAft>
+              <a:buSzPts val="1800"/>
+              <a:buChar char="●"/>
+            </a:pPr>
+            <a:r>
+              <a:rPr lang="hu" b="1"/>
+              <a:t>Forráskód</a:t>
+            </a:r>
+            <a:r>
+              <a:rPr lang="hu"/>
+              <a:t>: A program fájl tartalmazza a forráskódot, amelyet a programozó ír. Ez a kód ember által olvasható, és egy adott programozási nyelven íródott (pl. Python, Java, C++).</a:t>
+            </a:r>
+            <a:endParaRPr/>
+          </a:p>
+          <a:p>
+            <a:pPr marL="457200" lvl="0" indent="-342900" algn="l" rtl="0">
+              <a:spcBef>
+                <a:spcPts val="1000"/>
+              </a:spcBef>
+              <a:spcAft>
+                <a:spcPts val="0"/>
+              </a:spcAft>
+              <a:buSzPts val="1800"/>
+              <a:buChar char="●"/>
+            </a:pPr>
+            <a:r>
+              <a:rPr lang="hu" b="1"/>
+              <a:t>Futtatható kód</a:t>
+            </a:r>
+            <a:r>
+              <a:rPr lang="hu"/>
+              <a:t>: A forráskód lefordítva vagy értelmezve futtatható kód lesz, amelyet a számítógép közvetlenül tud végrehajtani.</a:t>
+            </a:r>
+            <a:endParaRPr/>
+          </a:p>
+          <a:p>
+            <a:pPr marL="457200" lvl="0" indent="-342900" algn="l" rtl="0">
+              <a:spcBef>
+                <a:spcPts val="1000"/>
+              </a:spcBef>
+              <a:spcAft>
+                <a:spcPts val="1000"/>
+              </a:spcAft>
+              <a:buSzPts val="1800"/>
+              <a:buChar char="●"/>
+            </a:pPr>
+            <a:r>
+              <a:rPr lang="hu" b="1"/>
+              <a:t>Adatok és erőforrások:</a:t>
+            </a:r>
+            <a:r>
+              <a:rPr lang="hu"/>
+              <a:t> A program fájl tartalmazhat adatokat, képeket, hangfájlokat vagy más erőforrásokat, amelyekre a programnak szüksége van.</a:t>
+            </a:r>
+            <a:endParaRPr/>
+          </a:p>
+        </p:txBody>
+      </p:sp>
+    </p:spTree>
+  </p:cSld>
+  <p:clrMapOvr>
+    <a:masterClrMapping/>
+  </p:clrMapOvr>
+</p:sld>
+</file>
+
+<file path=ppt/slides/slide40.xml><?xml version="1.0" encoding="utf-8"?>
 <p:sld xmlns:a="http://schemas.openxmlformats.org/drawingml/2006/main" xmlns:r="http://schemas.openxmlformats.org/officeDocument/2006/relationships" xmlns:p="http://schemas.openxmlformats.org/presentationml/2006/main">
   <p:cSld>
     <p:spTree>
@@ -14870,7 +15282,7 @@
 </p:sld>
 </file>
 
-<file path=ppt/slides/slide39.xml><?xml version="1.0" encoding="utf-8"?>
+<file path=ppt/slides/slide41.xml><?xml version="1.0" encoding="utf-8"?>
 <p:sld xmlns:a="http://schemas.openxmlformats.org/drawingml/2006/main" xmlns:r="http://schemas.openxmlformats.org/officeDocument/2006/relationships" xmlns:p="http://schemas.openxmlformats.org/presentationml/2006/main">
   <p:cSld>
     <p:spTree>
@@ -14929,163 +15341,7 @@
 </p:sld>
 </file>
 
-<file path=ppt/slides/slide4.xml><?xml version="1.0" encoding="utf-8"?>
-<p:sld xmlns:a="http://schemas.openxmlformats.org/drawingml/2006/main" xmlns:r="http://schemas.openxmlformats.org/officeDocument/2006/relationships" xmlns:p="http://schemas.openxmlformats.org/presentationml/2006/main">
-  <p:cSld>
-    <p:spTree>
-      <p:nvGrpSpPr>
-        <p:cNvPr id="1" name="Shape 77"/>
-        <p:cNvGrpSpPr/>
-        <p:nvPr/>
-      </p:nvGrpSpPr>
-      <p:grpSpPr>
-        <a:xfrm>
-          <a:off x="0" y="0"/>
-          <a:ext cx="0" cy="0"/>
-          <a:chOff x="0" y="0"/>
-          <a:chExt cx="0" cy="0"/>
-        </a:xfrm>
-      </p:grpSpPr>
-      <p:sp>
-        <p:nvSpPr>
-          <p:cNvPr id="78" name="Google Shape;78;p16"/>
-          <p:cNvSpPr txBox="1">
-            <a:spLocks noGrp="1"/>
-          </p:cNvSpPr>
-          <p:nvPr>
-            <p:ph type="title"/>
-          </p:nvPr>
-        </p:nvSpPr>
-        <p:spPr>
-          <a:xfrm>
-            <a:off x="311700" y="391350"/>
-            <a:ext cx="8520600" cy="626100"/>
-          </a:xfrm>
-          <a:prstGeom prst="rect">
-            <a:avLst/>
-          </a:prstGeom>
-        </p:spPr>
-        <p:txBody>
-          <a:bodyPr spcFirstLastPara="1" wrap="square" lIns="91425" tIns="91425" rIns="91425" bIns="91425" anchor="t" anchorCtr="0">
-            <a:normAutofit fontScale="90000"/>
-          </a:bodyPr>
-          <a:lstStyle/>
-          <a:p>
-            <a:pPr marL="0" lvl="0" indent="0" algn="l" rtl="0">
-              <a:spcBef>
-                <a:spcPts val="0"/>
-              </a:spcBef>
-              <a:spcAft>
-                <a:spcPts val="0"/>
-              </a:spcAft>
-              <a:buNone/>
-            </a:pPr>
-            <a:r>
-              <a:rPr lang="hu"/>
-              <a:t>Mi van a program fájlban?</a:t>
-            </a:r>
-            <a:endParaRPr/>
-          </a:p>
-        </p:txBody>
-      </p:sp>
-      <p:sp>
-        <p:nvSpPr>
-          <p:cNvPr id="79" name="Google Shape;79;p16"/>
-          <p:cNvSpPr txBox="1">
-            <a:spLocks noGrp="1"/>
-          </p:cNvSpPr>
-          <p:nvPr>
-            <p:ph type="body" idx="1"/>
-          </p:nvPr>
-        </p:nvSpPr>
-        <p:spPr>
-          <a:xfrm>
-            <a:off x="311700" y="1152475"/>
-            <a:ext cx="8520600" cy="3416400"/>
-          </a:xfrm>
-          <a:prstGeom prst="rect">
-            <a:avLst/>
-          </a:prstGeom>
-        </p:spPr>
-        <p:txBody>
-          <a:bodyPr spcFirstLastPara="1" wrap="square" lIns="91425" tIns="91425" rIns="91425" bIns="91425" anchor="t" anchorCtr="0">
-            <a:normAutofit/>
-          </a:bodyPr>
-          <a:lstStyle/>
-          <a:p>
-            <a:pPr marL="457200" lvl="0" indent="-342900" algn="l" rtl="0">
-              <a:spcBef>
-                <a:spcPts val="0"/>
-              </a:spcBef>
-              <a:spcAft>
-                <a:spcPts val="0"/>
-              </a:spcAft>
-              <a:buSzPts val="1800"/>
-              <a:buChar char="●"/>
-            </a:pPr>
-            <a:r>
-              <a:rPr lang="hu" b="1"/>
-              <a:t>Forráskód</a:t>
-            </a:r>
-            <a:r>
-              <a:rPr lang="hu"/>
-              <a:t>: A program fájl tartalmazza a forráskódot, amelyet a programozó ír. Ez a kód ember által olvasható, és egy adott programozási nyelven íródott (pl. Python, Java, C++).</a:t>
-            </a:r>
-            <a:endParaRPr/>
-          </a:p>
-          <a:p>
-            <a:pPr marL="457200" lvl="0" indent="-342900" algn="l" rtl="0">
-              <a:spcBef>
-                <a:spcPts val="1000"/>
-              </a:spcBef>
-              <a:spcAft>
-                <a:spcPts val="0"/>
-              </a:spcAft>
-              <a:buSzPts val="1800"/>
-              <a:buChar char="●"/>
-            </a:pPr>
-            <a:r>
-              <a:rPr lang="hu" b="1"/>
-              <a:t>Futtatható kód</a:t>
-            </a:r>
-            <a:r>
-              <a:rPr lang="hu"/>
-              <a:t>: A forráskód lefordítva vagy értelmezve futtatható kód lesz, amelyet a számítógép közvetlenül tud végrehajtani.</a:t>
-            </a:r>
-            <a:endParaRPr/>
-          </a:p>
-          <a:p>
-            <a:pPr marL="457200" lvl="0" indent="-342900" algn="l" rtl="0">
-              <a:spcBef>
-                <a:spcPts val="1000"/>
-              </a:spcBef>
-              <a:spcAft>
-                <a:spcPts val="1000"/>
-              </a:spcAft>
-              <a:buSzPts val="1800"/>
-              <a:buChar char="●"/>
-            </a:pPr>
-            <a:r>
-              <a:rPr lang="hu" b="1"/>
-              <a:t>Adatok és erőforrások:</a:t>
-            </a:r>
-            <a:r>
-              <a:rPr lang="hu"/>
-              <a:t> A program fájl tartalmazhat adatokat, képeket, hangfájlokat vagy más erőforrásokat, amelyekre a programnak szüksége van.</a:t>
-            </a:r>
-            <a:endParaRPr/>
-          </a:p>
-        </p:txBody>
-      </p:sp>
-    </p:spTree>
-  </p:cSld>
-  <p:clrMapOvr>
-    <a:masterClrMapping/>
-  </p:clrMapOvr>
-</p:sld>
-</file>
-
-<file path=ppt/slides/slide40.xml><?xml version="1.0" encoding="utf-8"?>
+<file path=ppt/slides/slide42.xml><?xml version="1.0" encoding="utf-8"?>
 <p:sld xmlns:a="http://schemas.openxmlformats.org/drawingml/2006/main" xmlns:r="http://schemas.openxmlformats.org/officeDocument/2006/relationships" xmlns:p="http://schemas.openxmlformats.org/presentationml/2006/main">
   <p:cSld>
     <p:spTree>
@@ -15180,7 +15436,7 @@
 </p:sld>
 </file>
 
-<file path=ppt/slides/slide41.xml><?xml version="1.0" encoding="utf-8"?>
+<file path=ppt/slides/slide43.xml><?xml version="1.0" encoding="utf-8"?>
 <p:sld xmlns:a="http://schemas.openxmlformats.org/drawingml/2006/main" xmlns:r="http://schemas.openxmlformats.org/officeDocument/2006/relationships" xmlns:p="http://schemas.openxmlformats.org/presentationml/2006/main">
   <p:cSld>
     <p:spTree>
@@ -15303,7 +15559,7 @@
 </p:sld>
 </file>
 
-<file path=ppt/slides/slide42.xml><?xml version="1.0" encoding="utf-8"?>
+<file path=ppt/slides/slide44.xml><?xml version="1.0" encoding="utf-8"?>
 <p:sld xmlns:a="http://schemas.openxmlformats.org/drawingml/2006/main" xmlns:r="http://schemas.openxmlformats.org/officeDocument/2006/relationships" xmlns:p="http://schemas.openxmlformats.org/presentationml/2006/main">
   <p:cSld>
     <p:spTree>
@@ -15398,7 +15654,7 @@
 </p:sld>
 </file>
 
-<file path=ppt/slides/slide43.xml><?xml version="1.0" encoding="utf-8"?>
+<file path=ppt/slides/slide45.xml><?xml version="1.0" encoding="utf-8"?>
 <p:sld xmlns:a="http://schemas.openxmlformats.org/drawingml/2006/main" xmlns:r="http://schemas.openxmlformats.org/officeDocument/2006/relationships" xmlns:p="http://schemas.openxmlformats.org/presentationml/2006/main">
   <p:cSld>
     <p:spTree>
@@ -15547,7 +15803,7 @@
 </p:sld>
 </file>
 
-<file path=ppt/slides/slide44.xml><?xml version="1.0" encoding="utf-8"?>
+<file path=ppt/slides/slide46.xml><?xml version="1.0" encoding="utf-8"?>
 <p:sld xmlns:a="http://schemas.openxmlformats.org/drawingml/2006/main" xmlns:r="http://schemas.openxmlformats.org/officeDocument/2006/relationships" xmlns:p="http://schemas.openxmlformats.org/presentationml/2006/main">
   <p:cSld>
     <p:spTree>
@@ -15696,7 +15952,7 @@
 </p:sld>
 </file>
 
-<file path=ppt/slides/slide45.xml><?xml version="1.0" encoding="utf-8"?>
+<file path=ppt/slides/slide47.xml><?xml version="1.0" encoding="utf-8"?>
 <p:sld xmlns:a="http://schemas.openxmlformats.org/drawingml/2006/main" xmlns:r="http://schemas.openxmlformats.org/officeDocument/2006/relationships" xmlns:p="http://schemas.openxmlformats.org/presentationml/2006/main">
   <p:cSld>
     <p:spTree>
@@ -16124,7 +16380,7 @@
 </p:sld>
 </file>
 
-<file path=ppt/slides/slide46.xml><?xml version="1.0" encoding="utf-8"?>
+<file path=ppt/slides/slide48.xml><?xml version="1.0" encoding="utf-8"?>
 <p:sld xmlns:a="http://schemas.openxmlformats.org/drawingml/2006/main" xmlns:r="http://schemas.openxmlformats.org/officeDocument/2006/relationships" xmlns:p="http://schemas.openxmlformats.org/presentationml/2006/main">
   <p:cSld>
     <p:spTree>
@@ -16219,7 +16475,7 @@
 </p:sld>
 </file>
 
-<file path=ppt/slides/slide47.xml><?xml version="1.0" encoding="utf-8"?>
+<file path=ppt/slides/slide49.xml><?xml version="1.0" encoding="utf-8"?>
 <p:sld xmlns:a="http://schemas.openxmlformats.org/drawingml/2006/main" xmlns:r="http://schemas.openxmlformats.org/officeDocument/2006/relationships" xmlns:p="http://schemas.openxmlformats.org/presentationml/2006/main">
   <p:cSld>
     <p:spTree>
@@ -16314,7 +16570,281 @@
 </p:sld>
 </file>
 
-<file path=ppt/slides/slide48.xml><?xml version="1.0" encoding="utf-8"?>
+<file path=ppt/slides/slide5.xml><?xml version="1.0" encoding="utf-8"?>
+<p:sld xmlns:a="http://schemas.openxmlformats.org/drawingml/2006/main" xmlns:r="http://schemas.openxmlformats.org/officeDocument/2006/relationships" xmlns:p="http://schemas.openxmlformats.org/presentationml/2006/main">
+  <p:cSld>
+    <p:spTree>
+      <p:nvGrpSpPr>
+        <p:cNvPr id="1" name="Shape 83"/>
+        <p:cNvGrpSpPr/>
+        <p:nvPr/>
+      </p:nvGrpSpPr>
+      <p:grpSpPr>
+        <a:xfrm>
+          <a:off x="0" y="0"/>
+          <a:ext cx="0" cy="0"/>
+          <a:chOff x="0" y="0"/>
+          <a:chExt cx="0" cy="0"/>
+        </a:xfrm>
+      </p:grpSpPr>
+      <p:sp>
+        <p:nvSpPr>
+          <p:cNvPr id="84" name="Google Shape;84;p17"/>
+          <p:cNvSpPr txBox="1">
+            <a:spLocks noGrp="1"/>
+          </p:cNvSpPr>
+          <p:nvPr>
+            <p:ph type="title"/>
+          </p:nvPr>
+        </p:nvSpPr>
+        <p:spPr>
+          <a:xfrm>
+            <a:off x="311700" y="391350"/>
+            <a:ext cx="8520600" cy="626100"/>
+          </a:xfrm>
+          <a:prstGeom prst="rect">
+            <a:avLst/>
+          </a:prstGeom>
+        </p:spPr>
+        <p:txBody>
+          <a:bodyPr spcFirstLastPara="1" wrap="square" lIns="91425" tIns="91425" rIns="91425" bIns="91425" anchor="t" anchorCtr="0">
+            <a:normAutofit fontScale="90000"/>
+          </a:bodyPr>
+          <a:lstStyle/>
+          <a:p>
+            <a:pPr marL="0" lvl="0" indent="0" algn="l" rtl="0">
+              <a:spcBef>
+                <a:spcPts val="0"/>
+              </a:spcBef>
+              <a:spcAft>
+                <a:spcPts val="0"/>
+              </a:spcAft>
+              <a:buNone/>
+            </a:pPr>
+            <a:r>
+              <a:rPr lang="hu"/>
+              <a:t>Programozási nyelvek típusai</a:t>
+            </a:r>
+            <a:endParaRPr/>
+          </a:p>
+        </p:txBody>
+      </p:sp>
+      <p:sp>
+        <p:nvSpPr>
+          <p:cNvPr id="85" name="Google Shape;85;p17"/>
+          <p:cNvSpPr txBox="1">
+            <a:spLocks noGrp="1"/>
+          </p:cNvSpPr>
+          <p:nvPr>
+            <p:ph type="body" idx="1"/>
+          </p:nvPr>
+        </p:nvSpPr>
+        <p:spPr>
+          <a:xfrm>
+            <a:off x="311700" y="1152475"/>
+            <a:ext cx="8520600" cy="3416400"/>
+          </a:xfrm>
+          <a:prstGeom prst="rect">
+            <a:avLst/>
+          </a:prstGeom>
+        </p:spPr>
+        <p:txBody>
+          <a:bodyPr spcFirstLastPara="1" wrap="square" lIns="91425" tIns="91425" rIns="91425" bIns="91425" anchor="t" anchorCtr="0">
+            <a:normAutofit/>
+          </a:bodyPr>
+          <a:lstStyle/>
+          <a:p>
+            <a:pPr marL="457200" lvl="0" indent="-342900" algn="l" rtl="0">
+              <a:spcBef>
+                <a:spcPts val="0"/>
+              </a:spcBef>
+              <a:spcAft>
+                <a:spcPts val="0"/>
+              </a:spcAft>
+              <a:buSzPts val="1800"/>
+              <a:buChar char="●"/>
+            </a:pPr>
+            <a:r>
+              <a:rPr lang="hu" b="1"/>
+              <a:t>Fordított nyelvek</a:t>
+            </a:r>
+            <a:r>
+              <a:rPr lang="hu"/>
+              <a:t> (pl. C, C++):</a:t>
+            </a:r>
+            <a:endParaRPr/>
+          </a:p>
+          <a:p>
+            <a:pPr marL="914400" lvl="1" indent="-317500" algn="l" rtl="0">
+              <a:spcBef>
+                <a:spcPts val="0"/>
+              </a:spcBef>
+              <a:spcAft>
+                <a:spcPts val="0"/>
+              </a:spcAft>
+              <a:buSzPts val="1400"/>
+              <a:buChar char="○"/>
+            </a:pPr>
+            <a:r>
+              <a:rPr lang="hu"/>
+              <a:t>A forráskódot egy fordítóprogram (compiler) gépi kódra fordítja, amelyet a számítógép közvetlenül tud futtatni.</a:t>
+            </a:r>
+            <a:endParaRPr/>
+          </a:p>
+          <a:p>
+            <a:pPr marL="914400" lvl="1" indent="-317500" algn="l" rtl="0">
+              <a:spcBef>
+                <a:spcPts val="0"/>
+              </a:spcBef>
+              <a:spcAft>
+                <a:spcPts val="0"/>
+              </a:spcAft>
+              <a:buSzPts val="1400"/>
+              <a:buChar char="○"/>
+            </a:pPr>
+            <a:r>
+              <a:rPr lang="hu"/>
+              <a:t>Gyors futási sebesség, de a fordítás időigényes.</a:t>
+            </a:r>
+            <a:endParaRPr/>
+          </a:p>
+          <a:p>
+            <a:pPr marL="457200" lvl="0" indent="-342900" algn="l" rtl="0">
+              <a:spcBef>
+                <a:spcPts val="0"/>
+              </a:spcBef>
+              <a:spcAft>
+                <a:spcPts val="0"/>
+              </a:spcAft>
+              <a:buSzPts val="1800"/>
+              <a:buChar char="●"/>
+            </a:pPr>
+            <a:r>
+              <a:rPr lang="hu" b="1"/>
+              <a:t>Értelmezett nyelvek </a:t>
+            </a:r>
+            <a:r>
+              <a:rPr lang="hu"/>
+              <a:t>(pl. Python, JavaScript):</a:t>
+            </a:r>
+            <a:endParaRPr/>
+          </a:p>
+          <a:p>
+            <a:pPr marL="914400" lvl="1" indent="-317500" algn="l" rtl="0">
+              <a:spcBef>
+                <a:spcPts val="0"/>
+              </a:spcBef>
+              <a:spcAft>
+                <a:spcPts val="0"/>
+              </a:spcAft>
+              <a:buSzPts val="1400"/>
+              <a:buChar char="○"/>
+            </a:pPr>
+            <a:r>
+              <a:rPr lang="hu"/>
+              <a:t>A forráskódot egy interpreter soronként értelmezi és hajtja végre.</a:t>
+            </a:r>
+            <a:endParaRPr/>
+          </a:p>
+          <a:p>
+            <a:pPr marL="914400" lvl="1" indent="-317500" algn="l" rtl="0">
+              <a:spcBef>
+                <a:spcPts val="0"/>
+              </a:spcBef>
+              <a:spcAft>
+                <a:spcPts val="0"/>
+              </a:spcAft>
+              <a:buSzPts val="1400"/>
+              <a:buChar char="○"/>
+            </a:pPr>
+            <a:r>
+              <a:rPr lang="hu"/>
+              <a:t>Könnyebb hibakeresés, de lassabb futási sebesség.</a:t>
+            </a:r>
+            <a:endParaRPr/>
+          </a:p>
+          <a:p>
+            <a:pPr marL="457200" lvl="0" indent="-342900" algn="l" rtl="0">
+              <a:spcBef>
+                <a:spcPts val="0"/>
+              </a:spcBef>
+              <a:spcAft>
+                <a:spcPts val="0"/>
+              </a:spcAft>
+              <a:buSzPts val="1800"/>
+              <a:buChar char="●"/>
+            </a:pPr>
+            <a:r>
+              <a:rPr lang="hu" b="1"/>
+              <a:t>Közvetítő (meta) kódot generáló nyelvek </a:t>
+            </a:r>
+            <a:r>
+              <a:rPr lang="hu"/>
+              <a:t>(pl. Java):</a:t>
+            </a:r>
+            <a:endParaRPr/>
+          </a:p>
+          <a:p>
+            <a:pPr marL="914400" lvl="1" indent="-317500" algn="l" rtl="0">
+              <a:spcBef>
+                <a:spcPts val="0"/>
+              </a:spcBef>
+              <a:spcAft>
+                <a:spcPts val="0"/>
+              </a:spcAft>
+              <a:buSzPts val="1400"/>
+              <a:buChar char="○"/>
+            </a:pPr>
+            <a:r>
+              <a:rPr lang="hu"/>
+              <a:t>A forráskódot egy közvetítő kódra (bytecode) fordítja, amelyet egy virtuális gép (pl. Java Virtual Machine azaz </a:t>
+            </a:r>
+            <a:r>
+              <a:rPr lang="hu" b="1"/>
+              <a:t>JVM</a:t>
+            </a:r>
+            <a:r>
+              <a:rPr lang="hu"/>
+              <a:t>) hajt végre.</a:t>
+            </a:r>
+            <a:endParaRPr/>
+          </a:p>
+          <a:p>
+            <a:pPr marL="914400" lvl="1" indent="-317500" algn="l" rtl="0">
+              <a:spcBef>
+                <a:spcPts val="0"/>
+              </a:spcBef>
+              <a:spcAft>
+                <a:spcPts val="0"/>
+              </a:spcAft>
+              <a:buSzPts val="1400"/>
+              <a:buChar char="○"/>
+            </a:pPr>
+            <a:r>
+              <a:rPr lang="hu"/>
+              <a:t>Platformfüggetlenség, de a virtuális gép (Java Runtime Environment azaz </a:t>
+            </a:r>
+            <a:r>
+              <a:rPr lang="hu" b="1"/>
+              <a:t>JRE)</a:t>
+            </a:r>
+            <a:r>
+              <a:rPr lang="hu"/>
+              <a:t> szükséges a futtatáshoz.</a:t>
+            </a:r>
+            <a:endParaRPr/>
+          </a:p>
+        </p:txBody>
+      </p:sp>
+    </p:spTree>
+  </p:cSld>
+  <p:clrMapOvr>
+    <a:masterClrMapping/>
+  </p:clrMapOvr>
+</p:sld>
+</file>
+
+<file path=ppt/slides/slide50.xml><?xml version="1.0" encoding="utf-8"?>
 <p:sld xmlns:a="http://schemas.openxmlformats.org/drawingml/2006/main" xmlns:r="http://schemas.openxmlformats.org/officeDocument/2006/relationships" xmlns:p="http://schemas.openxmlformats.org/presentationml/2006/main">
   <p:cSld>
     <p:spTree>
@@ -16415,7 +16945,7 @@
 </p:sld>
 </file>
 
-<file path=ppt/slides/slide49.xml><?xml version="1.0" encoding="utf-8"?>
+<file path=ppt/slides/slide51.xml><?xml version="1.0" encoding="utf-8"?>
 <p:sld xmlns:a="http://schemas.openxmlformats.org/drawingml/2006/main" xmlns:r="http://schemas.openxmlformats.org/officeDocument/2006/relationships" xmlns:p="http://schemas.openxmlformats.org/presentationml/2006/main">
   <p:cSld>
     <p:spTree>
@@ -16564,281 +17094,7 @@
 </p:sld>
 </file>
 
-<file path=ppt/slides/slide5.xml><?xml version="1.0" encoding="utf-8"?>
-<p:sld xmlns:a="http://schemas.openxmlformats.org/drawingml/2006/main" xmlns:r="http://schemas.openxmlformats.org/officeDocument/2006/relationships" xmlns:p="http://schemas.openxmlformats.org/presentationml/2006/main">
-  <p:cSld>
-    <p:spTree>
-      <p:nvGrpSpPr>
-        <p:cNvPr id="1" name="Shape 83"/>
-        <p:cNvGrpSpPr/>
-        <p:nvPr/>
-      </p:nvGrpSpPr>
-      <p:grpSpPr>
-        <a:xfrm>
-          <a:off x="0" y="0"/>
-          <a:ext cx="0" cy="0"/>
-          <a:chOff x="0" y="0"/>
-          <a:chExt cx="0" cy="0"/>
-        </a:xfrm>
-      </p:grpSpPr>
-      <p:sp>
-        <p:nvSpPr>
-          <p:cNvPr id="84" name="Google Shape;84;p17"/>
-          <p:cNvSpPr txBox="1">
-            <a:spLocks noGrp="1"/>
-          </p:cNvSpPr>
-          <p:nvPr>
-            <p:ph type="title"/>
-          </p:nvPr>
-        </p:nvSpPr>
-        <p:spPr>
-          <a:xfrm>
-            <a:off x="311700" y="391350"/>
-            <a:ext cx="8520600" cy="626100"/>
-          </a:xfrm>
-          <a:prstGeom prst="rect">
-            <a:avLst/>
-          </a:prstGeom>
-        </p:spPr>
-        <p:txBody>
-          <a:bodyPr spcFirstLastPara="1" wrap="square" lIns="91425" tIns="91425" rIns="91425" bIns="91425" anchor="t" anchorCtr="0">
-            <a:normAutofit fontScale="90000"/>
-          </a:bodyPr>
-          <a:lstStyle/>
-          <a:p>
-            <a:pPr marL="0" lvl="0" indent="0" algn="l" rtl="0">
-              <a:spcBef>
-                <a:spcPts val="0"/>
-              </a:spcBef>
-              <a:spcAft>
-                <a:spcPts val="0"/>
-              </a:spcAft>
-              <a:buNone/>
-            </a:pPr>
-            <a:r>
-              <a:rPr lang="hu"/>
-              <a:t>Programozási nyelvek típusai</a:t>
-            </a:r>
-            <a:endParaRPr/>
-          </a:p>
-        </p:txBody>
-      </p:sp>
-      <p:sp>
-        <p:nvSpPr>
-          <p:cNvPr id="85" name="Google Shape;85;p17"/>
-          <p:cNvSpPr txBox="1">
-            <a:spLocks noGrp="1"/>
-          </p:cNvSpPr>
-          <p:nvPr>
-            <p:ph type="body" idx="1"/>
-          </p:nvPr>
-        </p:nvSpPr>
-        <p:spPr>
-          <a:xfrm>
-            <a:off x="311700" y="1152475"/>
-            <a:ext cx="8520600" cy="3416400"/>
-          </a:xfrm>
-          <a:prstGeom prst="rect">
-            <a:avLst/>
-          </a:prstGeom>
-        </p:spPr>
-        <p:txBody>
-          <a:bodyPr spcFirstLastPara="1" wrap="square" lIns="91425" tIns="91425" rIns="91425" bIns="91425" anchor="t" anchorCtr="0">
-            <a:normAutofit/>
-          </a:bodyPr>
-          <a:lstStyle/>
-          <a:p>
-            <a:pPr marL="457200" lvl="0" indent="-342900" algn="l" rtl="0">
-              <a:spcBef>
-                <a:spcPts val="0"/>
-              </a:spcBef>
-              <a:spcAft>
-                <a:spcPts val="0"/>
-              </a:spcAft>
-              <a:buSzPts val="1800"/>
-              <a:buChar char="●"/>
-            </a:pPr>
-            <a:r>
-              <a:rPr lang="hu" b="1"/>
-              <a:t>Fordított nyelvek</a:t>
-            </a:r>
-            <a:r>
-              <a:rPr lang="hu"/>
-              <a:t> (pl. C, C++):</a:t>
-            </a:r>
-            <a:endParaRPr/>
-          </a:p>
-          <a:p>
-            <a:pPr marL="914400" lvl="1" indent="-317500" algn="l" rtl="0">
-              <a:spcBef>
-                <a:spcPts val="0"/>
-              </a:spcBef>
-              <a:spcAft>
-                <a:spcPts val="0"/>
-              </a:spcAft>
-              <a:buSzPts val="1400"/>
-              <a:buChar char="○"/>
-            </a:pPr>
-            <a:r>
-              <a:rPr lang="hu"/>
-              <a:t>A forráskódot egy fordítóprogram (compiler) gépi kódra fordítja, amelyet a számítógép közvetlenül tud futtatni.</a:t>
-            </a:r>
-            <a:endParaRPr/>
-          </a:p>
-          <a:p>
-            <a:pPr marL="914400" lvl="1" indent="-317500" algn="l" rtl="0">
-              <a:spcBef>
-                <a:spcPts val="0"/>
-              </a:spcBef>
-              <a:spcAft>
-                <a:spcPts val="0"/>
-              </a:spcAft>
-              <a:buSzPts val="1400"/>
-              <a:buChar char="○"/>
-            </a:pPr>
-            <a:r>
-              <a:rPr lang="hu"/>
-              <a:t>Gyors futási sebesség, de a fordítás időigényes.</a:t>
-            </a:r>
-            <a:endParaRPr/>
-          </a:p>
-          <a:p>
-            <a:pPr marL="457200" lvl="0" indent="-342900" algn="l" rtl="0">
-              <a:spcBef>
-                <a:spcPts val="0"/>
-              </a:spcBef>
-              <a:spcAft>
-                <a:spcPts val="0"/>
-              </a:spcAft>
-              <a:buSzPts val="1800"/>
-              <a:buChar char="●"/>
-            </a:pPr>
-            <a:r>
-              <a:rPr lang="hu" b="1"/>
-              <a:t>Értelmezett nyelvek </a:t>
-            </a:r>
-            <a:r>
-              <a:rPr lang="hu"/>
-              <a:t>(pl. Python, JavaScript):</a:t>
-            </a:r>
-            <a:endParaRPr/>
-          </a:p>
-          <a:p>
-            <a:pPr marL="914400" lvl="1" indent="-317500" algn="l" rtl="0">
-              <a:spcBef>
-                <a:spcPts val="0"/>
-              </a:spcBef>
-              <a:spcAft>
-                <a:spcPts val="0"/>
-              </a:spcAft>
-              <a:buSzPts val="1400"/>
-              <a:buChar char="○"/>
-            </a:pPr>
-            <a:r>
-              <a:rPr lang="hu"/>
-              <a:t>A forráskódot egy interpreter soronként értelmezi és hajtja végre.</a:t>
-            </a:r>
-            <a:endParaRPr/>
-          </a:p>
-          <a:p>
-            <a:pPr marL="914400" lvl="1" indent="-317500" algn="l" rtl="0">
-              <a:spcBef>
-                <a:spcPts val="0"/>
-              </a:spcBef>
-              <a:spcAft>
-                <a:spcPts val="0"/>
-              </a:spcAft>
-              <a:buSzPts val="1400"/>
-              <a:buChar char="○"/>
-            </a:pPr>
-            <a:r>
-              <a:rPr lang="hu"/>
-              <a:t>Könnyebb hibakeresés, de lassabb futási sebesség.</a:t>
-            </a:r>
-            <a:endParaRPr/>
-          </a:p>
-          <a:p>
-            <a:pPr marL="457200" lvl="0" indent="-342900" algn="l" rtl="0">
-              <a:spcBef>
-                <a:spcPts val="0"/>
-              </a:spcBef>
-              <a:spcAft>
-                <a:spcPts val="0"/>
-              </a:spcAft>
-              <a:buSzPts val="1800"/>
-              <a:buChar char="●"/>
-            </a:pPr>
-            <a:r>
-              <a:rPr lang="hu" b="1"/>
-              <a:t>Közvetítő (meta) kódot generáló nyelvek </a:t>
-            </a:r>
-            <a:r>
-              <a:rPr lang="hu"/>
-              <a:t>(pl. Java):</a:t>
-            </a:r>
-            <a:endParaRPr/>
-          </a:p>
-          <a:p>
-            <a:pPr marL="914400" lvl="1" indent="-317500" algn="l" rtl="0">
-              <a:spcBef>
-                <a:spcPts val="0"/>
-              </a:spcBef>
-              <a:spcAft>
-                <a:spcPts val="0"/>
-              </a:spcAft>
-              <a:buSzPts val="1400"/>
-              <a:buChar char="○"/>
-            </a:pPr>
-            <a:r>
-              <a:rPr lang="hu"/>
-              <a:t>A forráskódot egy közvetítő kódra (bytecode) fordítja, amelyet egy virtuális gép (pl. Java Virtual Machine azaz </a:t>
-            </a:r>
-            <a:r>
-              <a:rPr lang="hu" b="1"/>
-              <a:t>JVM</a:t>
-            </a:r>
-            <a:r>
-              <a:rPr lang="hu"/>
-              <a:t>) hajt végre.</a:t>
-            </a:r>
-            <a:endParaRPr/>
-          </a:p>
-          <a:p>
-            <a:pPr marL="914400" lvl="1" indent="-317500" algn="l" rtl="0">
-              <a:spcBef>
-                <a:spcPts val="0"/>
-              </a:spcBef>
-              <a:spcAft>
-                <a:spcPts val="0"/>
-              </a:spcAft>
-              <a:buSzPts val="1400"/>
-              <a:buChar char="○"/>
-            </a:pPr>
-            <a:r>
-              <a:rPr lang="hu"/>
-              <a:t>Platformfüggetlenség, de a virtuális gép (Java Runtime Environment azaz </a:t>
-            </a:r>
-            <a:r>
-              <a:rPr lang="hu" b="1"/>
-              <a:t>JRE)</a:t>
-            </a:r>
-            <a:r>
-              <a:rPr lang="hu"/>
-              <a:t> szükséges a futtatáshoz.</a:t>
-            </a:r>
-            <a:endParaRPr/>
-          </a:p>
-        </p:txBody>
-      </p:sp>
-    </p:spTree>
-  </p:cSld>
-  <p:clrMapOvr>
-    <a:masterClrMapping/>
-  </p:clrMapOvr>
-</p:sld>
-</file>
-
-<file path=ppt/slides/slide50.xml><?xml version="1.0" encoding="utf-8"?>
+<file path=ppt/slides/slide52.xml><?xml version="1.0" encoding="utf-8"?>
 <p:sld xmlns:a="http://schemas.openxmlformats.org/drawingml/2006/main" xmlns:r="http://schemas.openxmlformats.org/officeDocument/2006/relationships" xmlns:p="http://schemas.openxmlformats.org/presentationml/2006/main">
   <p:cSld>
     <p:spTree>
@@ -16987,7 +17243,7 @@
 </p:sld>
 </file>
 
-<file path=ppt/slides/slide51.xml><?xml version="1.0" encoding="utf-8"?>
+<file path=ppt/slides/slide53.xml><?xml version="1.0" encoding="utf-8"?>
 <p:sld xmlns:a="http://schemas.openxmlformats.org/drawingml/2006/main" xmlns:r="http://schemas.openxmlformats.org/officeDocument/2006/relationships" xmlns:p="http://schemas.openxmlformats.org/presentationml/2006/main">
   <p:cSld>
     <p:spTree>

</xml_diff>